<commit_message>
Update inContact.pptx and ~$Protractor.pptx
</commit_message>
<xml_diff>
--- a/Document/Study_document/inContact.pptx
+++ b/Document/Study_document/inContact.pptx
@@ -5,7 +5,7 @@
     <p:sldMasterId id="2147483648" r:id="rId1"/>
   </p:sldMasterIdLst>
   <p:notesMasterIdLst>
-    <p:notesMasterId r:id="rId21"/>
+    <p:notesMasterId r:id="rId25"/>
   </p:notesMasterIdLst>
   <p:sldIdLst>
     <p:sldId id="256" r:id="rId2"/>
@@ -16,17 +16,21 @@
     <p:sldId id="276" r:id="rId7"/>
     <p:sldId id="287" r:id="rId8"/>
     <p:sldId id="275" r:id="rId9"/>
-    <p:sldId id="283" r:id="rId10"/>
-    <p:sldId id="284" r:id="rId11"/>
-    <p:sldId id="285" r:id="rId12"/>
-    <p:sldId id="277" r:id="rId13"/>
-    <p:sldId id="289" r:id="rId14"/>
-    <p:sldId id="290" r:id="rId15"/>
-    <p:sldId id="291" r:id="rId16"/>
-    <p:sldId id="292" r:id="rId17"/>
-    <p:sldId id="293" r:id="rId18"/>
-    <p:sldId id="294" r:id="rId19"/>
-    <p:sldId id="271" r:id="rId20"/>
+    <p:sldId id="298" r:id="rId10"/>
+    <p:sldId id="283" r:id="rId11"/>
+    <p:sldId id="284" r:id="rId12"/>
+    <p:sldId id="285" r:id="rId13"/>
+    <p:sldId id="277" r:id="rId14"/>
+    <p:sldId id="289" r:id="rId15"/>
+    <p:sldId id="290" r:id="rId16"/>
+    <p:sldId id="291" r:id="rId17"/>
+    <p:sldId id="295" r:id="rId18"/>
+    <p:sldId id="292" r:id="rId19"/>
+    <p:sldId id="293" r:id="rId20"/>
+    <p:sldId id="294" r:id="rId21"/>
+    <p:sldId id="297" r:id="rId22"/>
+    <p:sldId id="296" r:id="rId23"/>
+    <p:sldId id="271" r:id="rId24"/>
   </p:sldIdLst>
   <p:sldSz cx="12192000" cy="6858000"/>
   <p:notesSz cx="6858000" cy="9144000"/>
@@ -4520,6 +4524,467 @@
         </p:nvGraphicFramePr>
         <p:xfrm>
           <a:off x="1154955" y="1654175"/>
+          <a:ext cx="9869170" cy="4602480"/>
+        </p:xfrm>
+        <a:graphic>
+          <a:graphicData uri="http://schemas.openxmlformats.org/drawingml/2006/table">
+            <a:tbl>
+              <a:tblPr firstRow="1" bandRow="1">
+                <a:tableStyleId>{5C22544A-7EE6-4342-B048-85BDC9FD1C3A}</a:tableStyleId>
+              </a:tblPr>
+              <a:tblGrid>
+                <a:gridCol w="4934585"/>
+                <a:gridCol w="4934585"/>
+              </a:tblGrid>
+              <a:tr h="381000">
+                <a:tc>
+                  <a:txBody>
+                    <a:bodyPr/>
+                    <a:lstStyle/>
+                    <a:p>
+                      <a:pPr algn="ctr">
+                        <a:buNone/>
+                      </a:pPr>
+                      <a:r>
+                        <a:rPr lang="en-US" altLang="en-US" dirty="0"/>
+                        <a:t>Typescript</a:t>
+                      </a:r>
+                    </a:p>
+                  </a:txBody>
+                  <a:tcPr/>
+                </a:tc>
+                <a:tc>
+                  <a:txBody>
+                    <a:bodyPr/>
+                    <a:lstStyle/>
+                    <a:p>
+                      <a:pPr algn="ctr">
+                        <a:buNone/>
+                      </a:pPr>
+                      <a:r>
+                        <a:rPr lang="en-US" altLang="en-US" sz="1800" dirty="0">
+                          <a:sym typeface="+mn-ea"/>
+                        </a:rPr>
+                        <a:t>J</a:t>
+                      </a:r>
+                      <a:r>
+                        <a:rPr lang="en-US" sz="1800" dirty="0">
+                          <a:sym typeface="+mn-ea"/>
+                        </a:rPr>
+                        <a:t>ava</a:t>
+                      </a:r>
+                      <a:endParaRPr lang="en-US" dirty="0"/>
+                    </a:p>
+                  </a:txBody>
+                  <a:tcPr/>
+                </a:tc>
+              </a:tr>
+              <a:tr h="381000">
+                <a:tc>
+                  <a:txBody>
+                    <a:bodyPr/>
+                    <a:lstStyle/>
+                    <a:p>
+                      <a:pPr marL="0" marR="0" indent="0" algn="l" defTabSz="457200" rtl="0" eaLnBrk="1" fontAlgn="auto" latinLnBrk="0" hangingPunct="1">
+                        <a:lnSpc>
+                          <a:spcPct val="100000"/>
+                        </a:lnSpc>
+                        <a:spcBef>
+                          <a:spcPts val="0"/>
+                        </a:spcBef>
+                        <a:spcAft>
+                          <a:spcPts val="0"/>
+                        </a:spcAft>
+                        <a:buClrTx/>
+                        <a:buSzTx/>
+                        <a:buFontTx/>
+                        <a:buNone/>
+                        <a:defRPr/>
+                      </a:pPr>
+                      <a:r>
+                        <a:rPr lang="en-US" sz="1800" kern="1200" smtClean="0">
+                          <a:solidFill>
+                            <a:schemeClr val="dk1"/>
+                          </a:solidFill>
+                          <a:latin typeface="+mn-lt"/>
+                          <a:ea typeface="+mn-ea"/>
+                          <a:cs typeface="+mn-cs"/>
+                        </a:rPr>
+                        <a:t>A </a:t>
+                      </a:r>
+                      <a:r>
+                        <a:rPr lang="en-US" sz="1800" i="1" kern="1200" smtClean="0">
+                          <a:solidFill>
+                            <a:schemeClr val="dk1"/>
+                          </a:solidFill>
+                          <a:latin typeface="+mn-lt"/>
+                          <a:ea typeface="+mn-ea"/>
+                          <a:cs typeface="+mn-cs"/>
+                        </a:rPr>
+                        <a:t>superset</a:t>
+                      </a:r>
+                      <a:r>
+                        <a:rPr lang="en-US" sz="1800" kern="1200" smtClean="0">
+                          <a:solidFill>
+                            <a:schemeClr val="dk1"/>
+                          </a:solidFill>
+                          <a:latin typeface="+mn-lt"/>
+                          <a:ea typeface="+mn-ea"/>
+                          <a:cs typeface="+mn-cs"/>
+                        </a:rPr>
+                        <a:t> of JavaScript, It is used to add additional static type and check type at compile time</a:t>
+                      </a:r>
+                      <a:endParaRPr lang="vi-VN" sz="1800" kern="1200" smtClean="0">
+                        <a:solidFill>
+                          <a:schemeClr val="dk1"/>
+                        </a:solidFill>
+                        <a:latin typeface="+mn-lt"/>
+                        <a:ea typeface="+mn-ea"/>
+                        <a:cs typeface="+mn-cs"/>
+                      </a:endParaRPr>
+                    </a:p>
+                  </a:txBody>
+                  <a:tcPr/>
+                </a:tc>
+                <a:tc>
+                  <a:txBody>
+                    <a:bodyPr/>
+                    <a:lstStyle/>
+                    <a:p>
+                      <a:pPr>
+                        <a:buNone/>
+                      </a:pPr>
+                      <a:r>
+                        <a:rPr lang="en-US" smtClean="0"/>
+                        <a:t>A pure oriented object programming language</a:t>
+                      </a:r>
+                      <a:endParaRPr lang="en-US"/>
+                    </a:p>
+                  </a:txBody>
+                  <a:tcPr/>
+                </a:tc>
+              </a:tr>
+              <a:tr h="381000">
+                <a:tc>
+                  <a:txBody>
+                    <a:bodyPr/>
+                    <a:lstStyle/>
+                    <a:p>
+                      <a:pPr>
+                        <a:buNone/>
+                      </a:pPr>
+                      <a:r>
+                        <a:rPr lang="en-US" smtClean="0"/>
+                        <a:t>There</a:t>
+                      </a:r>
+                      <a:r>
+                        <a:rPr lang="en-US" baseline="0" smtClean="0"/>
+                        <a:t> is not access modifier for class </a:t>
+                      </a:r>
+                      <a:endParaRPr lang="en-US"/>
+                    </a:p>
+                  </a:txBody>
+                  <a:tcPr/>
+                </a:tc>
+                <a:tc>
+                  <a:txBody>
+                    <a:bodyPr/>
+                    <a:lstStyle/>
+                    <a:p>
+                      <a:pPr>
+                        <a:buNone/>
+                      </a:pPr>
+                      <a:r>
+                        <a:rPr lang="en-US" smtClean="0"/>
+                        <a:t>There is access modifier</a:t>
+                      </a:r>
+                      <a:r>
+                        <a:rPr lang="en-US" baseline="0" smtClean="0"/>
+                        <a:t> for class</a:t>
+                      </a:r>
+                      <a:endParaRPr lang="en-US"/>
+                    </a:p>
+                  </a:txBody>
+                  <a:tcPr/>
+                </a:tc>
+              </a:tr>
+              <a:tr h="381000">
+                <a:tc>
+                  <a:txBody>
+                    <a:bodyPr/>
+                    <a:lstStyle/>
+                    <a:p>
+                      <a:pPr>
+                        <a:buNone/>
+                      </a:pPr>
+                      <a:r>
+                        <a:rPr lang="en-US" dirty="0" smtClean="0"/>
+                        <a:t>Happening</a:t>
+                      </a:r>
+                      <a:r>
+                        <a:rPr lang="en-US" baseline="0" dirty="0" smtClean="0"/>
+                        <a:t> circular import problem because It don’t have access modifier for class</a:t>
+                      </a:r>
+                      <a:endParaRPr lang="en-US" dirty="0"/>
+                    </a:p>
+                  </a:txBody>
+                  <a:tcPr/>
+                </a:tc>
+                <a:tc>
+                  <a:txBody>
+                    <a:bodyPr/>
+                    <a:lstStyle/>
+                    <a:p>
+                      <a:pPr>
+                        <a:buNone/>
+                      </a:pPr>
+                      <a:r>
+                        <a:rPr lang="en-US" dirty="0" smtClean="0"/>
+                        <a:t>Circular</a:t>
+                      </a:r>
+                      <a:r>
+                        <a:rPr lang="en-US" baseline="0" dirty="0" smtClean="0"/>
+                        <a:t> import problem is not happened, because it have access modifier for class</a:t>
+                      </a:r>
+                      <a:endParaRPr lang="en-US" dirty="0"/>
+                    </a:p>
+                  </a:txBody>
+                  <a:tcPr/>
+                </a:tc>
+              </a:tr>
+              <a:tr h="381000">
+                <a:tc>
+                  <a:txBody>
+                    <a:bodyPr/>
+                    <a:lstStyle/>
+                    <a:p>
+                      <a:pPr>
+                        <a:buNone/>
+                      </a:pPr>
+                      <a:r>
+                        <a:rPr lang="en-US" dirty="0" smtClean="0"/>
+                        <a:t>Access</a:t>
+                      </a:r>
+                      <a:r>
+                        <a:rPr lang="en-US" baseline="0" dirty="0" smtClean="0"/>
+                        <a:t> modifier for instance variable and method:</a:t>
+                      </a:r>
+                    </a:p>
+                    <a:p>
+                      <a:pPr marL="285750" indent="-285750">
+                        <a:buFont typeface="Arial" panose="020B0604020202020204" pitchFamily="34" charset="0"/>
+                        <a:buChar char="•"/>
+                      </a:pPr>
+                      <a:r>
+                        <a:rPr lang="en-US" baseline="0" dirty="0" smtClean="0"/>
+                        <a:t>Having Public, Protected, Private access modifier </a:t>
+                      </a:r>
+                    </a:p>
+                    <a:p>
+                      <a:pPr marL="342900" indent="-342900">
+                        <a:buFont typeface="Arial" panose="020B0604020202020204" pitchFamily="34" charset="0"/>
+                        <a:buChar char="•"/>
+                      </a:pPr>
+                      <a:r>
+                        <a:rPr lang="en-US" dirty="0" smtClean="0"/>
+                        <a:t>‘Public’</a:t>
+                      </a:r>
+                      <a:r>
+                        <a:rPr lang="en-US" baseline="0" dirty="0" smtClean="0"/>
+                        <a:t> is default</a:t>
+                      </a:r>
+                    </a:p>
+                    <a:p>
+                      <a:pPr marL="342900" indent="-342900">
+                        <a:buFont typeface="Arial" panose="020B0604020202020204" pitchFamily="34" charset="0"/>
+                        <a:buChar char="•"/>
+                      </a:pPr>
+                      <a:r>
+                        <a:rPr lang="en-US" baseline="0" dirty="0" smtClean="0"/>
+                        <a:t>‘Protected’ scope is within class and any objects that inherits from it</a:t>
+                      </a:r>
+                    </a:p>
+                  </a:txBody>
+                  <a:tcPr/>
+                </a:tc>
+                <a:tc>
+                  <a:txBody>
+                    <a:bodyPr/>
+                    <a:lstStyle/>
+                    <a:p>
+                      <a:pPr marL="0" marR="0" indent="0" algn="l" defTabSz="457200" rtl="0" eaLnBrk="1" fontAlgn="auto" latinLnBrk="0" hangingPunct="1">
+                        <a:lnSpc>
+                          <a:spcPct val="100000"/>
+                        </a:lnSpc>
+                        <a:spcBef>
+                          <a:spcPts val="0"/>
+                        </a:spcBef>
+                        <a:spcAft>
+                          <a:spcPts val="0"/>
+                        </a:spcAft>
+                        <a:buClrTx/>
+                        <a:buSzTx/>
+                        <a:buFontTx/>
+                        <a:buNone/>
+                        <a:defRPr/>
+                      </a:pPr>
+                      <a:r>
+                        <a:rPr lang="en-US" dirty="0" smtClean="0"/>
+                        <a:t>Access</a:t>
+                      </a:r>
+                      <a:r>
+                        <a:rPr lang="en-US" baseline="0" dirty="0" smtClean="0"/>
+                        <a:t> modifier for instance variable and method:</a:t>
+                      </a:r>
+                    </a:p>
+                    <a:p>
+                      <a:pPr marL="285750" marR="0" indent="-285750" algn="l" defTabSz="457200" rtl="0" eaLnBrk="1" fontAlgn="auto" latinLnBrk="0" hangingPunct="1">
+                        <a:lnSpc>
+                          <a:spcPct val="100000"/>
+                        </a:lnSpc>
+                        <a:spcBef>
+                          <a:spcPts val="0"/>
+                        </a:spcBef>
+                        <a:spcAft>
+                          <a:spcPts val="0"/>
+                        </a:spcAft>
+                        <a:buClrTx/>
+                        <a:buSzTx/>
+                        <a:buFont typeface="Arial" panose="020B0604020202020204" pitchFamily="34" charset="0"/>
+                        <a:buChar char="•"/>
+                        <a:defRPr/>
+                      </a:pPr>
+                      <a:r>
+                        <a:rPr lang="en-US" baseline="0" dirty="0" smtClean="0"/>
+                        <a:t>Having Public, Protected ,Default , Private access modifier </a:t>
+                      </a:r>
+                    </a:p>
+                    <a:p>
+                      <a:pPr marL="285750" indent="-285750">
+                        <a:buFont typeface="Arial" panose="020B0604020202020204" pitchFamily="34" charset="0"/>
+                        <a:buChar char="•"/>
+                      </a:pPr>
+                      <a:r>
+                        <a:rPr lang="en-US" dirty="0" smtClean="0"/>
+                        <a:t>‘Default’</a:t>
+                      </a:r>
+                      <a:r>
+                        <a:rPr lang="en-US" baseline="0" dirty="0" smtClean="0"/>
+                        <a:t> is default</a:t>
+                      </a:r>
+                    </a:p>
+                    <a:p>
+                      <a:pPr marL="285750" marR="0" indent="-285750" algn="l" defTabSz="457200" rtl="0" eaLnBrk="1" fontAlgn="auto" latinLnBrk="0" hangingPunct="1">
+                        <a:lnSpc>
+                          <a:spcPct val="100000"/>
+                        </a:lnSpc>
+                        <a:spcBef>
+                          <a:spcPts val="0"/>
+                        </a:spcBef>
+                        <a:spcAft>
+                          <a:spcPts val="0"/>
+                        </a:spcAft>
+                        <a:buClrTx/>
+                        <a:buSzTx/>
+                        <a:buFont typeface="Arial" panose="020B0604020202020204" pitchFamily="34" charset="0"/>
+                        <a:buChar char="•"/>
+                        <a:defRPr/>
+                      </a:pPr>
+                      <a:r>
+                        <a:rPr lang="en-US" baseline="0" dirty="0" smtClean="0"/>
+                        <a:t>‘Protected’ scope is within package and any objects that inherits from it</a:t>
+                      </a:r>
+                    </a:p>
+                  </a:txBody>
+                  <a:tcPr/>
+                </a:tc>
+              </a:tr>
+            </a:tbl>
+          </a:graphicData>
+        </a:graphic>
+      </p:graphicFrame>
+    </p:spTree>
+  </p:cSld>
+  <p:clrMapOvr>
+    <a:masterClrMapping/>
+  </p:clrMapOvr>
+  <p:timing>
+    <p:tnLst>
+      <p:par>
+        <p:cTn id="1" dur="indefinite" restart="never" nodeType="tmRoot"/>
+      </p:par>
+    </p:tnLst>
+  </p:timing>
+</p:sld>
+</file>
+
+<file path=ppt/slides/slide11.xml><?xml version="1.0" encoding="utf-8"?>
+<p:sld xmlns:a="http://schemas.openxmlformats.org/drawingml/2006/main" xmlns:r="http://schemas.openxmlformats.org/officeDocument/2006/relationships" xmlns:p="http://schemas.openxmlformats.org/presentationml/2006/main">
+  <p:cSld>
+    <p:spTree>
+      <p:nvGrpSpPr>
+        <p:cNvPr id="1" name=""/>
+        <p:cNvGrpSpPr/>
+        <p:nvPr/>
+      </p:nvGrpSpPr>
+      <p:grpSpPr>
+        <a:xfrm>
+          <a:off x="0" y="0"/>
+          <a:ext cx="0" cy="0"/>
+          <a:chOff x="0" y="0"/>
+          <a:chExt cx="0" cy="0"/>
+        </a:xfrm>
+      </p:grpSpPr>
+      <p:sp>
+        <p:nvSpPr>
+          <p:cNvPr id="2" name="Title 1"/>
+          <p:cNvSpPr>
+            <a:spLocks noGrp="1"/>
+          </p:cNvSpPr>
+          <p:nvPr>
+            <p:ph type="title"/>
+          </p:nvPr>
+        </p:nvSpPr>
+        <p:spPr/>
+        <p:txBody>
+          <a:bodyPr/>
+          <a:lstStyle/>
+          <a:p>
+            <a:r>
+              <a:rPr lang="en-US"/>
+              <a:t>Comparing some characteristic when coding in </a:t>
+            </a:r>
+            <a:r>
+              <a:rPr lang="en-US" altLang="en-US"/>
+              <a:t>T</a:t>
+            </a:r>
+            <a:r>
+              <a:rPr lang="en-US"/>
+              <a:t>ypescript and </a:t>
+            </a:r>
+            <a:r>
+              <a:rPr lang="en-US" altLang="en-US"/>
+              <a:t>J</a:t>
+            </a:r>
+            <a:r>
+              <a:rPr lang="en-US"/>
+              <a:t>ava</a:t>
+            </a:r>
+          </a:p>
+        </p:txBody>
+      </p:sp>
+      <p:graphicFrame>
+        <p:nvGraphicFramePr>
+          <p:cNvPr id="4" name="Content Placeholder 3"/>
+          <p:cNvGraphicFramePr>
+            <a:graphicFrameLocks noGrp="1"/>
+          </p:cNvGraphicFramePr>
+          <p:nvPr>
+            <p:ph idx="1"/>
+          </p:nvPr>
+        </p:nvGraphicFramePr>
+        <p:xfrm>
+          <a:off x="1154955" y="1654175"/>
           <a:ext cx="9869170" cy="3154680"/>
         </p:xfrm>
         <a:graphic>
@@ -5134,7 +5599,7 @@
 </p:sld>
 </file>
 
-<file path=ppt/slides/slide11.xml><?xml version="1.0" encoding="utf-8"?>
+<file path=ppt/slides/slide12.xml><?xml version="1.0" encoding="utf-8"?>
 <p:sld xmlns:a="http://schemas.openxmlformats.org/drawingml/2006/main" xmlns:r="http://schemas.openxmlformats.org/officeDocument/2006/relationships" xmlns:p="http://schemas.openxmlformats.org/presentationml/2006/main">
   <p:cSld>
     <p:spTree>
@@ -5262,147 +5727,6 @@
 </p:sld>
 </file>
 
-<file path=ppt/slides/slide12.xml><?xml version="1.0" encoding="utf-8"?>
-<p:sld xmlns:a="http://schemas.openxmlformats.org/drawingml/2006/main" xmlns:r="http://schemas.openxmlformats.org/officeDocument/2006/relationships" xmlns:p="http://schemas.openxmlformats.org/presentationml/2006/main">
-  <p:cSld>
-    <p:spTree>
-      <p:nvGrpSpPr>
-        <p:cNvPr id="1" name=""/>
-        <p:cNvGrpSpPr/>
-        <p:nvPr/>
-      </p:nvGrpSpPr>
-      <p:grpSpPr>
-        <a:xfrm>
-          <a:off x="0" y="0"/>
-          <a:ext cx="0" cy="0"/>
-          <a:chOff x="0" y="0"/>
-          <a:chExt cx="0" cy="0"/>
-        </a:xfrm>
-      </p:grpSpPr>
-      <p:sp>
-        <p:nvSpPr>
-          <p:cNvPr id="2" name="Title 1"/>
-          <p:cNvSpPr>
-            <a:spLocks noGrp="1"/>
-          </p:cNvSpPr>
-          <p:nvPr>
-            <p:ph type="title"/>
-          </p:nvPr>
-        </p:nvSpPr>
-        <p:spPr/>
-        <p:txBody>
-          <a:bodyPr/>
-          <a:lstStyle/>
-          <a:p>
-            <a:r>
-              <a:rPr lang="en-US" dirty="0" smtClean="0"/>
-              <a:t>Typescript Reference</a:t>
-            </a:r>
-            <a:endParaRPr lang="en-US" dirty="0"/>
-          </a:p>
-        </p:txBody>
-      </p:sp>
-      <p:sp>
-        <p:nvSpPr>
-          <p:cNvPr id="3" name="Content Placeholder 2"/>
-          <p:cNvSpPr>
-            <a:spLocks noGrp="1"/>
-          </p:cNvSpPr>
-          <p:nvPr>
-            <p:ph idx="1"/>
-          </p:nvPr>
-        </p:nvSpPr>
-        <p:spPr/>
-        <p:txBody>
-          <a:bodyPr/>
-          <a:lstStyle/>
-          <a:p>
-            <a:pPr>
-              <a:buFont typeface="Wingdings" panose="05000000000000000000" pitchFamily="2" charset="2"/>
-              <a:buChar char="Ø"/>
-            </a:pPr>
-            <a:r>
-              <a:rPr lang="en-US" dirty="0">
-                <a:hlinkClick r:id="rId2"/>
-              </a:rPr>
-              <a:t>https://www.typescriptlang.org/docs/handbook/typescript-from-scratch.html</a:t>
-            </a:r>
-            <a:endParaRPr lang="en-US" dirty="0"/>
-          </a:p>
-          <a:p>
-            <a:pPr>
-              <a:buFont typeface="Wingdings" panose="05000000000000000000" pitchFamily="2" charset="2"/>
-              <a:buChar char="Ø"/>
-            </a:pPr>
-            <a:r>
-              <a:rPr lang="en-US" dirty="0" smtClean="0">
-                <a:hlinkClick r:id="rId3"/>
-              </a:rPr>
-              <a:t>https</a:t>
-            </a:r>
-            <a:r>
-              <a:rPr lang="en-US" dirty="0">
-                <a:hlinkClick r:id="rId3"/>
-              </a:rPr>
-              <a:t>://medium.com/@</a:t>
-            </a:r>
-            <a:r>
-              <a:rPr lang="en-US" dirty="0" smtClean="0">
-                <a:hlinkClick r:id="rId3"/>
-              </a:rPr>
-              <a:t>kgelpes/how-typescript-helps-us-prevent-the-most-common-error-in-javascript-development-2dbcb54cf12</a:t>
-            </a:r>
-            <a:endParaRPr lang="en-US" dirty="0" smtClean="0"/>
-          </a:p>
-          <a:p>
-            <a:pPr>
-              <a:buFont typeface="Wingdings" panose="05000000000000000000" pitchFamily="2" charset="2"/>
-              <a:buChar char="Ø"/>
-            </a:pPr>
-            <a:r>
-              <a:rPr lang="en-US" dirty="0">
-                <a:hlinkClick r:id="rId4"/>
-              </a:rPr>
-              <a:t>https://</a:t>
-            </a:r>
-            <a:r>
-              <a:rPr lang="en-US" dirty="0" smtClean="0">
-                <a:hlinkClick r:id="rId4"/>
-              </a:rPr>
-              <a:t>stackoverflow.com/questions/12694530/what-is-typescript-and-why-would-i-use-it-in-place-of-javascript</a:t>
-            </a:r>
-            <a:endParaRPr lang="en-US" dirty="0" smtClean="0"/>
-          </a:p>
-          <a:p>
-            <a:pPr>
-              <a:buFont typeface="Wingdings" panose="05000000000000000000" pitchFamily="2" charset="2"/>
-              <a:buChar char="Ø"/>
-            </a:pPr>
-            <a:r>
-              <a:rPr lang="en-US" dirty="0">
-                <a:hlinkClick r:id="rId5"/>
-              </a:rPr>
-              <a:t>https://channel9.msdn.com/posts/Anders-Hejlsberg-Introducing-TypeScript</a:t>
-            </a:r>
-            <a:endParaRPr lang="en-US" dirty="0"/>
-          </a:p>
-        </p:txBody>
-      </p:sp>
-    </p:spTree>
-  </p:cSld>
-  <p:clrMapOvr>
-    <a:masterClrMapping/>
-  </p:clrMapOvr>
-  <p:timing>
-    <p:tnLst>
-      <p:par>
-        <p:cTn id="1" dur="indefinite" restart="never" nodeType="tmRoot"/>
-      </p:par>
-    </p:tnLst>
-  </p:timing>
-</p:sld>
-</file>
-
 <file path=ppt/slides/slide13.xml><?xml version="1.0" encoding="utf-8"?>
 <p:sld xmlns:a="http://schemas.openxmlformats.org/drawingml/2006/main" xmlns:r="http://schemas.openxmlformats.org/officeDocument/2006/relationships" xmlns:p="http://schemas.openxmlformats.org/presentationml/2006/main">
   <p:cSld>
@@ -5437,7 +5761,7 @@
           <a:p>
             <a:r>
               <a:rPr lang="en-US" dirty="0" smtClean="0"/>
-              <a:t>Selenium</a:t>
+              <a:t>Typescript Reference</a:t>
             </a:r>
             <a:endParaRPr lang="en-US" dirty="0"/>
           </a:p>
@@ -5455,9 +5779,7 @@
         </p:nvSpPr>
         <p:spPr/>
         <p:txBody>
-          <a:bodyPr>
-            <a:normAutofit/>
-          </a:bodyPr>
+          <a:bodyPr/>
           <a:lstStyle/>
           <a:p>
             <a:pPr>
@@ -5465,13 +5787,12 @@
               <a:buChar char="Ø"/>
             </a:pPr>
             <a:r>
-              <a:rPr lang="en-US" dirty="0"/>
-              <a:t>Selenium is a free (open-source) automated testing framework used to validate web applications across different browsers and </a:t>
-            </a:r>
-            <a:r>
-              <a:rPr lang="en-US" dirty="0" smtClean="0"/>
-              <a:t>platforms</a:t>
-            </a:r>
+              <a:rPr lang="en-US" dirty="0">
+                <a:hlinkClick r:id="rId2"/>
+              </a:rPr>
+              <a:t>https://www.typescriptlang.org/docs/handbook/typescript-from-scratch.html</a:t>
+            </a:r>
+            <a:endParaRPr lang="en-US" dirty="0"/>
           </a:p>
           <a:p>
             <a:pPr>
@@ -5479,33 +5800,24 @@
               <a:buChar char="Ø"/>
             </a:pPr>
             <a:r>
-              <a:rPr lang="en-US" dirty="0" smtClean="0"/>
-              <a:t>Can </a:t>
-            </a:r>
-            <a:r>
-              <a:rPr lang="en-US" dirty="0"/>
-              <a:t>use multiple programming languages like Java, C#, Python </a:t>
-            </a:r>
-            <a:r>
-              <a:rPr lang="en-US" dirty="0" err="1"/>
-              <a:t>etc</a:t>
-            </a:r>
-            <a:r>
-              <a:rPr lang="en-US" dirty="0"/>
-              <a:t> to create </a:t>
-            </a:r>
-            <a:r>
-              <a:rPr lang="en-US" dirty="0" smtClean="0"/>
-              <a:t>Selenium </a:t>
-            </a:r>
-            <a:r>
-              <a:rPr lang="en-US" dirty="0"/>
-              <a:t>Test </a:t>
-            </a:r>
-            <a:r>
-              <a:rPr lang="en-US" dirty="0" smtClean="0"/>
-              <a:t>Scripts</a:t>
-            </a:r>
+              <a:rPr lang="en-US" dirty="0" smtClean="0">
+                <a:hlinkClick r:id="rId3"/>
+              </a:rPr>
+              <a:t>https</a:t>
+            </a:r>
+            <a:r>
+              <a:rPr lang="en-US" dirty="0">
+                <a:hlinkClick r:id="rId3"/>
+              </a:rPr>
+              <a:t>://medium.com/@</a:t>
+            </a:r>
+            <a:r>
+              <a:rPr lang="en-US" dirty="0" smtClean="0">
+                <a:hlinkClick r:id="rId3"/>
+              </a:rPr>
+              <a:t>kgelpes/how-typescript-helps-us-prevent-the-most-common-error-in-javascript-development-2dbcb54cf12</a:t>
+            </a:r>
+            <a:endParaRPr lang="en-US" dirty="0" smtClean="0"/>
           </a:p>
           <a:p>
             <a:pPr>
@@ -5513,65 +5825,35 @@
               <a:buChar char="Ø"/>
             </a:pPr>
             <a:r>
-              <a:rPr lang="en-US" dirty="0"/>
-              <a:t>Selenium Software is not just a single tool but a suite of software, each piece catering to different Selenium QA testing needs of an organization. Here is the list of </a:t>
-            </a:r>
-            <a:r>
-              <a:rPr lang="en-US" dirty="0" smtClean="0"/>
-              <a:t>tools:</a:t>
-            </a:r>
-          </a:p>
-          <a:p>
-            <a:pPr lvl="1">
+              <a:rPr lang="en-US" dirty="0">
+                <a:hlinkClick r:id="rId4"/>
+              </a:rPr>
+              <a:t>https://</a:t>
+            </a:r>
+            <a:r>
+              <a:rPr lang="en-US" dirty="0" smtClean="0">
+                <a:hlinkClick r:id="rId4"/>
+              </a:rPr>
+              <a:t>stackoverflow.com/questions/12694530/what-is-typescript-and-why-would-i-use-it-in-place-of-javascript</a:t>
+            </a:r>
+            <a:endParaRPr lang="en-US" dirty="0" smtClean="0"/>
+          </a:p>
+          <a:p>
+            <a:pPr>
               <a:buFont typeface="Wingdings" panose="05000000000000000000" pitchFamily="2" charset="2"/>
-              <a:buChar char="§"/>
+              <a:buChar char="Ø"/>
             </a:pPr>
             <a:r>
-              <a:rPr lang="en-US" dirty="0"/>
-              <a:t>Selenium Integrated Development Environment (IDE)</a:t>
-            </a:r>
-          </a:p>
-          <a:p>
-            <a:pPr lvl="1">
-              <a:buFont typeface="Wingdings" panose="05000000000000000000" pitchFamily="2" charset="2"/>
-              <a:buChar char="§"/>
-            </a:pPr>
-            <a:r>
-              <a:rPr lang="en-US" dirty="0" err="1" smtClean="0"/>
-              <a:t>WebDriver</a:t>
-            </a:r>
-            <a:r>
-              <a:rPr lang="vi-VN" dirty="0" smtClean="0"/>
-              <a:t> </a:t>
-            </a:r>
-            <a:endParaRPr lang="en-US" dirty="0" smtClean="0"/>
-          </a:p>
-          <a:p>
-            <a:pPr lvl="1">
-              <a:buFont typeface="Wingdings" panose="05000000000000000000" pitchFamily="2" charset="2"/>
-              <a:buChar char="§"/>
-            </a:pPr>
-            <a:r>
-              <a:rPr lang="en-US" dirty="0" smtClean="0"/>
-              <a:t>Selenium </a:t>
-            </a:r>
-            <a:r>
-              <a:rPr lang="en-US" dirty="0"/>
-              <a:t>Grid</a:t>
-            </a:r>
-          </a:p>
-          <a:p>
-            <a:pPr lvl="1"/>
+              <a:rPr lang="en-US" dirty="0">
+                <a:hlinkClick r:id="rId5"/>
+              </a:rPr>
+              <a:t>https://channel9.msdn.com/posts/Anders-Hejlsberg-Introducing-TypeScript</a:t>
+            </a:r>
             <a:endParaRPr lang="en-US" dirty="0"/>
           </a:p>
         </p:txBody>
       </p:sp>
     </p:spTree>
-    <p:extLst>
-      <p:ext uri="{BB962C8B-B14F-4D97-AF65-F5344CB8AC3E}">
-        <p14:creationId xmlns:p14="http://schemas.microsoft.com/office/powerpoint/2010/main" val="500114914"/>
-      </p:ext>
-    </p:extLst>
   </p:cSld>
   <p:clrMapOvr>
     <a:masterClrMapping/>
@@ -5619,9 +5901,10 @@
           <a:lstStyle/>
           <a:p>
             <a:r>
-              <a:rPr lang="en-US" dirty="0"/>
+              <a:rPr lang="en-US" dirty="0" smtClean="0"/>
               <a:t>Selenium</a:t>
             </a:r>
+            <a:endParaRPr lang="en-US" dirty="0"/>
           </a:p>
         </p:txBody>
       </p:sp>
@@ -5637,67 +5920,113 @@
         </p:nvSpPr>
         <p:spPr/>
         <p:txBody>
-          <a:bodyPr/>
+          <a:bodyPr>
+            <a:normAutofit/>
+          </a:bodyPr>
           <a:lstStyle/>
           <a:p>
+            <a:pPr>
+              <a:buFont typeface="Wingdings" panose="05000000000000000000" pitchFamily="2" charset="2"/>
+              <a:buChar char="Ø"/>
+            </a:pPr>
             <a:r>
               <a:rPr lang="en-US" dirty="0"/>
+              <a:t>Selenium is a free (open-source) automated testing framework used to validate web applications across different browsers and </a:t>
+            </a:r>
+            <a:r>
+              <a:rPr lang="en-US" dirty="0" smtClean="0"/>
+              <a:t>platforms</a:t>
+            </a:r>
+          </a:p>
+          <a:p>
+            <a:pPr>
+              <a:buFont typeface="Wingdings" panose="05000000000000000000" pitchFamily="2" charset="2"/>
+              <a:buChar char="Ø"/>
+            </a:pPr>
+            <a:r>
+              <a:rPr lang="en-US" dirty="0" smtClean="0"/>
+              <a:t>Can </a:t>
+            </a:r>
+            <a:r>
+              <a:rPr lang="en-US" dirty="0"/>
+              <a:t>use multiple programming languages like Java, C#, Python </a:t>
+            </a:r>
+            <a:r>
+              <a:rPr lang="en-US" dirty="0" err="1"/>
+              <a:t>etc</a:t>
+            </a:r>
+            <a:r>
+              <a:rPr lang="en-US" dirty="0"/>
+              <a:t> to create </a:t>
+            </a:r>
+            <a:r>
+              <a:rPr lang="en-US" dirty="0" smtClean="0"/>
               <a:t>Selenium </a:t>
             </a:r>
             <a:r>
-              <a:rPr lang="en-US" dirty="0" err="1"/>
+              <a:rPr lang="en-US" dirty="0"/>
+              <a:t>Test </a:t>
+            </a:r>
+            <a:r>
+              <a:rPr lang="en-US" dirty="0" smtClean="0"/>
+              <a:t>Scripts</a:t>
+            </a:r>
+          </a:p>
+          <a:p>
+            <a:pPr>
+              <a:buFont typeface="Wingdings" panose="05000000000000000000" pitchFamily="2" charset="2"/>
+              <a:buChar char="Ø"/>
+            </a:pPr>
+            <a:r>
+              <a:rPr lang="en-US" dirty="0"/>
+              <a:t>Selenium Software is not just a single tool but a suite of software, each piece catering to different Selenium QA testing needs of an organization. Here is the list of </a:t>
+            </a:r>
+            <a:r>
+              <a:rPr lang="en-US" dirty="0" smtClean="0"/>
+              <a:t>tools:</a:t>
+            </a:r>
+          </a:p>
+          <a:p>
+            <a:pPr lvl="1">
+              <a:buFont typeface="Wingdings" panose="05000000000000000000" pitchFamily="2" charset="2"/>
+              <a:buChar char="§"/>
+            </a:pPr>
+            <a:r>
+              <a:rPr lang="en-US" dirty="0"/>
+              <a:t>Selenium Integrated Development Environment (IDE)</a:t>
+            </a:r>
+          </a:p>
+          <a:p>
+            <a:pPr lvl="1">
+              <a:buFont typeface="Wingdings" panose="05000000000000000000" pitchFamily="2" charset="2"/>
+              <a:buChar char="§"/>
+            </a:pPr>
+            <a:r>
+              <a:rPr lang="en-US" dirty="0" err="1" smtClean="0"/>
               <a:t>WebDriver</a:t>
-            </a:r>
-            <a:r>
-              <a:rPr lang="en-US" dirty="0"/>
-              <a:t> drives a browser natively, as a real user would, either locally or on remote machines.</a:t>
-            </a:r>
-          </a:p>
-          <a:p>
-            <a:r>
-              <a:rPr lang="en-US" dirty="0"/>
-              <a:t>Selenium IDE is a Chrome and Firefox extension that makes it easy to record and playback tests in the browser.</a:t>
-            </a:r>
-          </a:p>
-          <a:p>
-            <a:r>
-              <a:rPr lang="en-US" dirty="0"/>
-              <a:t>Selenium Grid takes </a:t>
-            </a:r>
-            <a:r>
-              <a:rPr lang="en-US" dirty="0" err="1"/>
-              <a:t>WebDriver</a:t>
-            </a:r>
-            <a:r>
-              <a:rPr lang="en-US" dirty="0"/>
-              <a:t> to another level by running tests on many machines at the same </a:t>
-            </a:r>
-            <a:r>
-              <a:rPr lang="en-US" dirty="0" smtClean="0"/>
-              <a:t>time,</a:t>
             </a:r>
             <a:r>
               <a:rPr lang="vi-VN" dirty="0" smtClean="0"/>
               <a:t> </a:t>
             </a:r>
+            <a:endParaRPr lang="en-US" dirty="0" smtClean="0"/>
+          </a:p>
+          <a:p>
+            <a:pPr lvl="1">
+              <a:buFont typeface="Wingdings" panose="05000000000000000000" pitchFamily="2" charset="2"/>
+              <a:buChar char="§"/>
+            </a:pPr>
             <a:r>
               <a:rPr lang="en-US" dirty="0" smtClean="0"/>
-              <a:t>cutting </a:t>
+              <a:t>Selenium </a:t>
             </a:r>
             <a:r>
               <a:rPr lang="en-US" dirty="0"/>
-              <a:t>down on the time it takes to test on multiple browsers and operating systems.</a:t>
-            </a:r>
-            <a:br>
-              <a:rPr lang="en-US" dirty="0"/>
-            </a:br>
-            <a:r>
-              <a:rPr lang="en-US" dirty="0" smtClean="0"/>
-              <a:t/>
-            </a:r>
-            <a:br>
-              <a:rPr lang="en-US" dirty="0" smtClean="0"/>
-            </a:br>
+              <a:t>Grid</a:t>
+            </a:r>
+          </a:p>
+          <a:p>
+            <a:pPr lvl="1"/>
             <a:endParaRPr lang="en-US" dirty="0"/>
           </a:p>
         </p:txBody>
@@ -5705,13 +6034,20 @@
     </p:spTree>
     <p:extLst>
       <p:ext uri="{BB962C8B-B14F-4D97-AF65-F5344CB8AC3E}">
-        <p14:creationId xmlns:p14="http://schemas.microsoft.com/office/powerpoint/2010/main" val="2782128637"/>
+        <p14:creationId xmlns:p14="http://schemas.microsoft.com/office/powerpoint/2010/main" val="500114914"/>
       </p:ext>
     </p:extLst>
   </p:cSld>
   <p:clrMapOvr>
     <a:masterClrMapping/>
   </p:clrMapOvr>
+  <p:timing>
+    <p:tnLst>
+      <p:par>
+        <p:cTn id="1" dur="indefinite" restart="never" nodeType="tmRoot"/>
+      </p:par>
+    </p:tnLst>
+  </p:timing>
 </p:sld>
 </file>
 
@@ -5748,14 +6084,9 @@
           <a:lstStyle/>
           <a:p>
             <a:r>
-              <a:rPr lang="en-US" dirty="0" err="1" smtClean="0"/>
-              <a:t>Senlenium</a:t>
-            </a:r>
-            <a:r>
-              <a:rPr lang="en-US" dirty="0" smtClean="0"/>
-              <a:t> Reference</a:t>
-            </a:r>
-            <a:endParaRPr lang="en-US" dirty="0"/>
+              <a:rPr lang="en-US" dirty="0"/>
+              <a:t>Selenium</a:t>
+            </a:r>
           </a:p>
         </p:txBody>
       </p:sp>
@@ -5774,41 +6105,64 @@
           <a:bodyPr/>
           <a:lstStyle/>
           <a:p>
-            <a:pPr>
-              <a:buFont typeface="Wingdings" panose="05000000000000000000" pitchFamily="2" charset="2"/>
-              <a:buChar char="Ø"/>
-            </a:pPr>
-            <a:r>
-              <a:rPr lang="en-US" dirty="0">
-                <a:hlinkClick r:id="rId2"/>
-              </a:rPr>
-              <a:t>https://www.selenium.dev/projects</a:t>
-            </a:r>
-            <a:r>
-              <a:rPr lang="en-US" dirty="0" smtClean="0">
-                <a:hlinkClick r:id="rId2"/>
-              </a:rPr>
-              <a:t>/</a:t>
-            </a:r>
-            <a:endParaRPr lang="en-US" dirty="0" smtClean="0"/>
-          </a:p>
-          <a:p>
-            <a:pPr>
-              <a:buFont typeface="Wingdings" panose="05000000000000000000" pitchFamily="2" charset="2"/>
-              <a:buChar char="Ø"/>
-            </a:pPr>
-            <a:r>
-              <a:rPr lang="en-US" dirty="0">
-                <a:hlinkClick r:id="rId3"/>
-              </a:rPr>
-              <a:t>https://</a:t>
-            </a:r>
-            <a:r>
-              <a:rPr lang="en-US" dirty="0" smtClean="0">
-                <a:hlinkClick r:id="rId3"/>
-              </a:rPr>
-              <a:t>www.guru99.com/introduction-to-selenium.html</a:t>
-            </a:r>
+            <a:r>
+              <a:rPr lang="en-US" dirty="0"/>
+              <a:t>Selenium </a:t>
+            </a:r>
+            <a:r>
+              <a:rPr lang="en-US" dirty="0" err="1"/>
+              <a:t>WebDriver</a:t>
+            </a:r>
+            <a:r>
+              <a:rPr lang="en-US" dirty="0"/>
+              <a:t> drives a browser natively, as a real user would, either locally or on remote machines.</a:t>
+            </a:r>
+          </a:p>
+          <a:p>
+            <a:r>
+              <a:rPr lang="en-US" dirty="0"/>
+              <a:t>Selenium IDE is a Chrome and Firefox extension that makes it easy to record and playback tests in the browser.</a:t>
+            </a:r>
+          </a:p>
+          <a:p>
+            <a:r>
+              <a:rPr lang="en-US" dirty="0"/>
+              <a:t>Selenium Grid takes </a:t>
+            </a:r>
+            <a:r>
+              <a:rPr lang="en-US" dirty="0" err="1"/>
+              <a:t>WebDriver</a:t>
+            </a:r>
+            <a:r>
+              <a:rPr lang="en-US" dirty="0"/>
+              <a:t> to another level by running tests on many machines at the same </a:t>
+            </a:r>
+            <a:r>
+              <a:rPr lang="en-US" dirty="0" smtClean="0"/>
+              <a:t>time,</a:t>
+            </a:r>
+            <a:r>
+              <a:rPr lang="vi-VN" dirty="0" smtClean="0"/>
+              <a:t> </a:t>
+            </a:r>
+            <a:r>
+              <a:rPr lang="en-US" dirty="0" smtClean="0"/>
+              <a:t>cutting </a:t>
+            </a:r>
+            <a:r>
+              <a:rPr lang="en-US" dirty="0"/>
+              <a:t>down on the time it takes to test on multiple browsers and operating systems.</a:t>
+            </a:r>
+            <a:br>
+              <a:rPr lang="en-US" dirty="0"/>
+            </a:br>
+            <a:r>
+              <a:rPr lang="en-US" dirty="0" smtClean="0"/>
+              <a:t/>
+            </a:r>
+            <a:br>
+              <a:rPr lang="en-US" dirty="0" smtClean="0"/>
+            </a:br>
             <a:endParaRPr lang="en-US" dirty="0"/>
           </a:p>
         </p:txBody>
@@ -5816,7 +6170,7 @@
     </p:spTree>
     <p:extLst>
       <p:ext uri="{BB962C8B-B14F-4D97-AF65-F5344CB8AC3E}">
-        <p14:creationId xmlns:p14="http://schemas.microsoft.com/office/powerpoint/2010/main" val="755926977"/>
+        <p14:creationId xmlns:p14="http://schemas.microsoft.com/office/powerpoint/2010/main" val="2782128637"/>
       </p:ext>
     </p:extLst>
   </p:cSld>
@@ -5859,9 +6213,14 @@
           <a:lstStyle/>
           <a:p>
             <a:r>
-              <a:rPr lang="en-US" dirty="0"/>
-              <a:t>Protractor</a:t>
-            </a:r>
+              <a:rPr lang="en-US" dirty="0" err="1" smtClean="0"/>
+              <a:t>Senlenium</a:t>
+            </a:r>
+            <a:r>
+              <a:rPr lang="en-US" dirty="0" smtClean="0"/>
+              <a:t> Reference</a:t>
+            </a:r>
+            <a:endParaRPr lang="en-US" dirty="0"/>
           </a:p>
         </p:txBody>
       </p:sp>
@@ -5885,33 +6244,36 @@
               <a:buChar char="Ø"/>
             </a:pPr>
             <a:r>
-              <a:rPr lang="en-US" dirty="0"/>
-              <a:t>Protractor is an end-to-end test framework for Angular and </a:t>
-            </a:r>
-            <a:r>
-              <a:rPr lang="en-US" dirty="0" err="1"/>
-              <a:t>AngularJS</a:t>
-            </a:r>
-            <a:r>
-              <a:rPr lang="en-US" dirty="0"/>
-              <a:t> applications. Protractor runs tests against your application running in a real browser, interacting with it as a user would</a:t>
-            </a:r>
-            <a:r>
-              <a:rPr lang="en-US" dirty="0" smtClean="0"/>
-              <a:t>.</a:t>
-            </a:r>
+              <a:rPr lang="en-US" dirty="0">
+                <a:hlinkClick r:id="rId2"/>
+              </a:rPr>
+              <a:t>https://www.selenium.dev/projects</a:t>
+            </a:r>
+            <a:r>
+              <a:rPr lang="en-US" dirty="0" smtClean="0">
+                <a:hlinkClick r:id="rId2"/>
+              </a:rPr>
+              <a:t>/</a:t>
+            </a:r>
+            <a:endParaRPr lang="en-US" dirty="0" smtClean="0"/>
           </a:p>
           <a:p>
             <a:pPr>
               <a:buFont typeface="Wingdings" panose="05000000000000000000" pitchFamily="2" charset="2"/>
               <a:buChar char="Ø"/>
             </a:pPr>
-            <a:endParaRPr lang="vi-VN" dirty="0" smtClean="0"/>
-          </a:p>
-          <a:p>
-            <a:endParaRPr lang="vi-VN" dirty="0" smtClean="0"/>
-          </a:p>
-          <a:p>
+            <a:r>
+              <a:rPr lang="en-US" dirty="0">
+                <a:hlinkClick r:id="rId3"/>
+              </a:rPr>
+              <a:t>https://</a:t>
+            </a:r>
+            <a:r>
+              <a:rPr lang="en-US" dirty="0" smtClean="0">
+                <a:hlinkClick r:id="rId3"/>
+              </a:rPr>
+              <a:t>www.guru99.com/introduction-to-selenium.html</a:t>
+            </a:r>
             <a:endParaRPr lang="en-US" dirty="0"/>
           </a:p>
         </p:txBody>
@@ -5919,20 +6281,13 @@
     </p:spTree>
     <p:extLst>
       <p:ext uri="{BB962C8B-B14F-4D97-AF65-F5344CB8AC3E}">
-        <p14:creationId xmlns:p14="http://schemas.microsoft.com/office/powerpoint/2010/main" val="483566087"/>
+        <p14:creationId xmlns:p14="http://schemas.microsoft.com/office/powerpoint/2010/main" val="755926977"/>
       </p:ext>
     </p:extLst>
   </p:cSld>
   <p:clrMapOvr>
     <a:masterClrMapping/>
   </p:clrMapOvr>
-  <p:timing>
-    <p:tnLst>
-      <p:par>
-        <p:cTn id="1" dur="indefinite" restart="never" nodeType="tmRoot"/>
-      </p:par>
-    </p:tnLst>
-  </p:timing>
 </p:sld>
 </file>
 
@@ -5969,9 +6324,274 @@
           <a:lstStyle/>
           <a:p>
             <a:r>
+              <a:rPr lang="en-US" dirty="0" smtClean="0"/>
+              <a:t>Protractor</a:t>
+            </a:r>
+            <a:endParaRPr lang="en-US" dirty="0"/>
+          </a:p>
+        </p:txBody>
+      </p:sp>
+      <p:sp>
+        <p:nvSpPr>
+          <p:cNvPr id="3" name="Content Placeholder 2"/>
+          <p:cNvSpPr>
+            <a:spLocks noGrp="1"/>
+          </p:cNvSpPr>
+          <p:nvPr>
+            <p:ph idx="1"/>
+          </p:nvPr>
+        </p:nvSpPr>
+        <p:spPr/>
+        <p:txBody>
+          <a:bodyPr/>
+          <a:lstStyle/>
+          <a:p>
+            <a:pPr lvl="1">
+              <a:buFont typeface="+mj-lt"/>
+              <a:buAutoNum type="arabicPeriod"/>
+            </a:pPr>
+            <a:r>
+              <a:rPr lang="en-US" sz="2000" b="1" dirty="0" smtClean="0">
+                <a:solidFill>
+                  <a:schemeClr val="accent2"/>
+                </a:solidFill>
+              </a:rPr>
+              <a:t>Protractor Overview</a:t>
+            </a:r>
+          </a:p>
+          <a:p>
+            <a:pPr lvl="1">
+              <a:buFont typeface="+mj-lt"/>
+              <a:buAutoNum type="arabicPeriod"/>
+            </a:pPr>
+            <a:r>
+              <a:rPr lang="en-US" sz="2000" b="1" dirty="0">
+                <a:solidFill>
+                  <a:schemeClr val="accent2"/>
+                </a:solidFill>
+              </a:rPr>
+              <a:t>Comparing some Characteristic of Protractor and Selenium</a:t>
+            </a:r>
+            <a:endParaRPr lang="en-US" sz="2000" b="1" dirty="0">
+              <a:solidFill>
+                <a:schemeClr val="accent2"/>
+              </a:solidFill>
+            </a:endParaRPr>
+          </a:p>
+          <a:p>
+            <a:pPr lvl="1">
+              <a:buFont typeface="+mj-lt"/>
+              <a:buAutoNum type="arabicPeriod"/>
+            </a:pPr>
+            <a:endParaRPr lang="en-US" sz="2000" b="1" dirty="0">
+              <a:solidFill>
+                <a:schemeClr val="accent2"/>
+              </a:solidFill>
+            </a:endParaRPr>
+          </a:p>
+          <a:p>
+            <a:pPr lvl="1">
+              <a:buFont typeface="+mj-lt"/>
+              <a:buAutoNum type="arabicPeriod"/>
+            </a:pPr>
+            <a:endParaRPr lang="en-US" sz="2000" b="1" dirty="0" smtClean="0">
+              <a:solidFill>
+                <a:schemeClr val="accent2"/>
+              </a:solidFill>
+            </a:endParaRPr>
+          </a:p>
+          <a:p>
+            <a:pPr lvl="1">
+              <a:buFont typeface="+mj-lt"/>
+              <a:buAutoNum type="arabicPeriod"/>
+            </a:pPr>
+            <a:endParaRPr lang="en-US" sz="2000" b="1" dirty="0" smtClean="0">
+              <a:solidFill>
+                <a:schemeClr val="accent2"/>
+              </a:solidFill>
+            </a:endParaRPr>
+          </a:p>
+          <a:p>
+            <a:pPr lvl="1">
+              <a:buFont typeface="+mj-lt"/>
+              <a:buAutoNum type="arabicPeriod"/>
+            </a:pPr>
+            <a:endParaRPr lang="en-US" sz="2000" b="1" dirty="0">
+              <a:solidFill>
+                <a:schemeClr val="accent2"/>
+              </a:solidFill>
+            </a:endParaRPr>
+          </a:p>
+          <a:p>
+            <a:pPr lvl="1">
+              <a:buFont typeface="+mj-lt"/>
+              <a:buAutoNum type="arabicPeriod"/>
+            </a:pPr>
+            <a:endParaRPr lang="en-US" dirty="0"/>
+          </a:p>
+        </p:txBody>
+      </p:sp>
+    </p:spTree>
+    <p:extLst>
+      <p:ext uri="{BB962C8B-B14F-4D97-AF65-F5344CB8AC3E}">
+        <p14:creationId xmlns:p14="http://schemas.microsoft.com/office/powerpoint/2010/main" val="1019385255"/>
+      </p:ext>
+    </p:extLst>
+  </p:cSld>
+  <p:clrMapOvr>
+    <a:masterClrMapping/>
+  </p:clrMapOvr>
+</p:sld>
+</file>
+
+<file path=ppt/slides/slide18.xml><?xml version="1.0" encoding="utf-8"?>
+<p:sld xmlns:a="http://schemas.openxmlformats.org/drawingml/2006/main" xmlns:r="http://schemas.openxmlformats.org/officeDocument/2006/relationships" xmlns:p="http://schemas.openxmlformats.org/presentationml/2006/main">
+  <p:cSld>
+    <p:spTree>
+      <p:nvGrpSpPr>
+        <p:cNvPr id="1" name=""/>
+        <p:cNvGrpSpPr/>
+        <p:nvPr/>
+      </p:nvGrpSpPr>
+      <p:grpSpPr>
+        <a:xfrm>
+          <a:off x="0" y="0"/>
+          <a:ext cx="0" cy="0"/>
+          <a:chOff x="0" y="0"/>
+          <a:chExt cx="0" cy="0"/>
+        </a:xfrm>
+      </p:grpSpPr>
+      <p:sp>
+        <p:nvSpPr>
+          <p:cNvPr id="2" name="Title 1"/>
+          <p:cNvSpPr>
+            <a:spLocks noGrp="1"/>
+          </p:cNvSpPr>
+          <p:nvPr>
+            <p:ph type="title"/>
+          </p:nvPr>
+        </p:nvSpPr>
+        <p:spPr/>
+        <p:txBody>
+          <a:bodyPr/>
+          <a:lstStyle/>
+          <a:p>
+            <a:r>
+              <a:rPr lang="en-US" dirty="0" smtClean="0"/>
+              <a:t>Protractor Overview</a:t>
+            </a:r>
+            <a:endParaRPr lang="en-US" dirty="0"/>
+          </a:p>
+        </p:txBody>
+      </p:sp>
+      <p:sp>
+        <p:nvSpPr>
+          <p:cNvPr id="3" name="Content Placeholder 2"/>
+          <p:cNvSpPr>
+            <a:spLocks noGrp="1"/>
+          </p:cNvSpPr>
+          <p:nvPr>
+            <p:ph idx="1"/>
+          </p:nvPr>
+        </p:nvSpPr>
+        <p:spPr/>
+        <p:txBody>
+          <a:bodyPr/>
+          <a:lstStyle/>
+          <a:p>
+            <a:pPr>
+              <a:buFont typeface="Wingdings" panose="05000000000000000000" pitchFamily="2" charset="2"/>
+              <a:buChar char="Ø"/>
+            </a:pPr>
+            <a:r>
               <a:rPr lang="en-US" dirty="0"/>
-              <a:t>Protractor</a:t>
-            </a:r>
+              <a:t>Protractor is an end-to-end test framework for Angular and </a:t>
+            </a:r>
+            <a:r>
+              <a:rPr lang="en-US" dirty="0" err="1"/>
+              <a:t>AngularJS</a:t>
+            </a:r>
+            <a:r>
+              <a:rPr lang="en-US" dirty="0"/>
+              <a:t> applications. Protractor runs tests against your application running in a real browser, interacting with it as a user would</a:t>
+            </a:r>
+            <a:r>
+              <a:rPr lang="en-US" dirty="0" smtClean="0"/>
+              <a:t>.</a:t>
+            </a:r>
+          </a:p>
+          <a:p>
+            <a:pPr>
+              <a:buFont typeface="Wingdings" panose="05000000000000000000" pitchFamily="2" charset="2"/>
+              <a:buChar char="Ø"/>
+            </a:pPr>
+            <a:endParaRPr lang="vi-VN" dirty="0" smtClean="0"/>
+          </a:p>
+          <a:p>
+            <a:endParaRPr lang="vi-VN" dirty="0" smtClean="0"/>
+          </a:p>
+          <a:p>
+            <a:endParaRPr lang="en-US" dirty="0"/>
+          </a:p>
+        </p:txBody>
+      </p:sp>
+    </p:spTree>
+    <p:extLst>
+      <p:ext uri="{BB962C8B-B14F-4D97-AF65-F5344CB8AC3E}">
+        <p14:creationId xmlns:p14="http://schemas.microsoft.com/office/powerpoint/2010/main" val="483566087"/>
+      </p:ext>
+    </p:extLst>
+  </p:cSld>
+  <p:clrMapOvr>
+    <a:masterClrMapping/>
+  </p:clrMapOvr>
+  <p:timing>
+    <p:tnLst>
+      <p:par>
+        <p:cTn id="1" dur="indefinite" restart="never" nodeType="tmRoot"/>
+      </p:par>
+    </p:tnLst>
+  </p:timing>
+</p:sld>
+</file>
+
+<file path=ppt/slides/slide19.xml><?xml version="1.0" encoding="utf-8"?>
+<p:sld xmlns:a="http://schemas.openxmlformats.org/drawingml/2006/main" xmlns:r="http://schemas.openxmlformats.org/officeDocument/2006/relationships" xmlns:p="http://schemas.openxmlformats.org/presentationml/2006/main">
+  <p:cSld>
+    <p:spTree>
+      <p:nvGrpSpPr>
+        <p:cNvPr id="1" name=""/>
+        <p:cNvGrpSpPr/>
+        <p:nvPr/>
+      </p:nvGrpSpPr>
+      <p:grpSpPr>
+        <a:xfrm>
+          <a:off x="0" y="0"/>
+          <a:ext cx="0" cy="0"/>
+          <a:chOff x="0" y="0"/>
+          <a:chExt cx="0" cy="0"/>
+        </a:xfrm>
+      </p:grpSpPr>
+      <p:sp>
+        <p:nvSpPr>
+          <p:cNvPr id="2" name="Title 1"/>
+          <p:cNvSpPr>
+            <a:spLocks noGrp="1"/>
+          </p:cNvSpPr>
+          <p:nvPr>
+            <p:ph type="title"/>
+          </p:nvPr>
+        </p:nvSpPr>
+        <p:spPr/>
+        <p:txBody>
+          <a:bodyPr/>
+          <a:lstStyle/>
+          <a:p>
+            <a:r>
+              <a:rPr lang="en-US" dirty="0"/>
+              <a:t>Protractor Overview</a:t>
+            </a:r>
+            <a:endParaRPr lang="en-US" dirty="0"/>
           </a:p>
         </p:txBody>
       </p:sp>
@@ -6036,7 +6656,144 @@
 </p:sld>
 </file>
 
-<file path=ppt/slides/slide18.xml><?xml version="1.0" encoding="utf-8"?>
+<file path=ppt/slides/slide2.xml><?xml version="1.0" encoding="utf-8"?>
+<p:sld xmlns:a="http://schemas.openxmlformats.org/drawingml/2006/main" xmlns:r="http://schemas.openxmlformats.org/officeDocument/2006/relationships" xmlns:p="http://schemas.openxmlformats.org/presentationml/2006/main">
+  <p:cSld>
+    <p:spTree>
+      <p:nvGrpSpPr>
+        <p:cNvPr id="1" name=""/>
+        <p:cNvGrpSpPr/>
+        <p:nvPr/>
+      </p:nvGrpSpPr>
+      <p:grpSpPr>
+        <a:xfrm>
+          <a:off x="0" y="0"/>
+          <a:ext cx="0" cy="0"/>
+          <a:chOff x="0" y="0"/>
+          <a:chExt cx="0" cy="0"/>
+        </a:xfrm>
+      </p:grpSpPr>
+      <p:sp>
+        <p:nvSpPr>
+          <p:cNvPr id="2" name="Content Placeholder 1"/>
+          <p:cNvSpPr>
+            <a:spLocks noGrp="1"/>
+          </p:cNvSpPr>
+          <p:nvPr>
+            <p:ph idx="1"/>
+          </p:nvPr>
+        </p:nvSpPr>
+        <p:spPr/>
+        <p:txBody>
+          <a:bodyPr>
+            <a:normAutofit/>
+          </a:bodyPr>
+          <a:lstStyle/>
+          <a:p>
+            <a:pPr marL="914400" indent="-457200">
+              <a:buFont typeface="+mj-lt"/>
+              <a:buAutoNum type="arabicPeriod"/>
+            </a:pPr>
+            <a:r>
+              <a:rPr lang="en-US" sz="2000" b="1" dirty="0">
+                <a:solidFill>
+                  <a:schemeClr val="accent2"/>
+                </a:solidFill>
+              </a:rPr>
+              <a:t>Before Protractor</a:t>
+            </a:r>
+          </a:p>
+          <a:p>
+            <a:pPr marL="914400" indent="-457200">
+              <a:buFont typeface="+mj-lt"/>
+              <a:buAutoNum type="arabicPeriod"/>
+            </a:pPr>
+            <a:r>
+              <a:rPr lang="en-US" sz="2000" b="1" dirty="0">
+                <a:solidFill>
+                  <a:schemeClr val="accent2"/>
+                </a:solidFill>
+              </a:rPr>
+              <a:t>Protractor</a:t>
+            </a:r>
+          </a:p>
+          <a:p>
+            <a:pPr marL="914400" indent="-457200">
+              <a:buFont typeface="+mj-lt"/>
+              <a:buAutoNum type="arabicPeriod"/>
+            </a:pPr>
+            <a:r>
+              <a:rPr lang="en-US" sz="2000" b="1" dirty="0" smtClean="0">
+                <a:solidFill>
+                  <a:schemeClr val="accent2"/>
+                </a:solidFill>
+              </a:rPr>
+              <a:t>Q </a:t>
+            </a:r>
+            <a:r>
+              <a:rPr lang="en-US" sz="2000" b="1" dirty="0">
+                <a:solidFill>
+                  <a:schemeClr val="accent2"/>
+                </a:solidFill>
+              </a:rPr>
+              <a:t>and A</a:t>
+            </a:r>
+          </a:p>
+          <a:p>
+            <a:pPr marL="400050" lvl="1" indent="0">
+              <a:buNone/>
+            </a:pPr>
+            <a:endParaRPr lang="en-US" b="1" dirty="0">
+              <a:solidFill>
+                <a:schemeClr val="accent2"/>
+              </a:solidFill>
+            </a:endParaRPr>
+          </a:p>
+        </p:txBody>
+      </p:sp>
+      <p:sp>
+        <p:nvSpPr>
+          <p:cNvPr id="3" name="Title 2"/>
+          <p:cNvSpPr>
+            <a:spLocks noGrp="1"/>
+          </p:cNvSpPr>
+          <p:nvPr>
+            <p:ph type="title"/>
+          </p:nvPr>
+        </p:nvSpPr>
+        <p:spPr/>
+        <p:txBody>
+          <a:bodyPr/>
+          <a:lstStyle/>
+          <a:p>
+            <a:r>
+              <a:rPr lang="vi-VN" dirty="0" smtClean="0">
+                <a:latin typeface="Century Gothic (Body)"/>
+              </a:rPr>
+              <a:t>Content:</a:t>
+            </a:r>
+            <a:endParaRPr lang="en-US" dirty="0">
+              <a:latin typeface="Century Gothic (Body)"/>
+            </a:endParaRPr>
+          </a:p>
+        </p:txBody>
+      </p:sp>
+    </p:spTree>
+  </p:cSld>
+  <p:clrMapOvr>
+    <a:masterClrMapping/>
+  </p:clrMapOvr>
+  <p:timing>
+    <p:tnLst>
+      <p:par>
+        <p:cTn id="1" dur="indefinite" restart="never" nodeType="tmRoot"/>
+      </p:par>
+    </p:tnLst>
+  </p:timing>
+</p:sld>
+</file>
+
+<file path=ppt/slides/slide20.xml><?xml version="1.0" encoding="utf-8"?>
 <p:sld xmlns:a="http://schemas.openxmlformats.org/drawingml/2006/main" xmlns:r="http://schemas.openxmlformats.org/officeDocument/2006/relationships" xmlns:p="http://schemas.openxmlformats.org/presentationml/2006/main">
   <p:cSld>
     <p:spTree>
@@ -6070,7 +6827,15 @@
           <a:p>
             <a:r>
               <a:rPr lang="en-US" dirty="0" smtClean="0"/>
-              <a:t>Comparing Protractor and Selenium</a:t>
+              <a:t>Comparing </a:t>
+            </a:r>
+            <a:r>
+              <a:rPr lang="en-US" dirty="0" smtClean="0"/>
+              <a:t>some Characteristic of </a:t>
+            </a:r>
+            <a:r>
+              <a:rPr lang="en-US" dirty="0" smtClean="0"/>
+              <a:t>Protractor and Selenium</a:t>
             </a:r>
             <a:endParaRPr lang="en-US" dirty="0"/>
           </a:p>
@@ -6815,7 +7580,522 @@
 </p:sld>
 </file>
 
-<file path=ppt/slides/slide19.xml><?xml version="1.0" encoding="utf-8"?>
+<file path=ppt/slides/slide21.xml><?xml version="1.0" encoding="utf-8"?>
+<p:sld xmlns:a="http://schemas.openxmlformats.org/drawingml/2006/main" xmlns:r="http://schemas.openxmlformats.org/officeDocument/2006/relationships" xmlns:p="http://schemas.openxmlformats.org/presentationml/2006/main">
+  <p:cSld>
+    <p:spTree>
+      <p:nvGrpSpPr>
+        <p:cNvPr id="1" name=""/>
+        <p:cNvGrpSpPr/>
+        <p:nvPr/>
+      </p:nvGrpSpPr>
+      <p:grpSpPr>
+        <a:xfrm>
+          <a:off x="0" y="0"/>
+          <a:ext cx="0" cy="0"/>
+          <a:chOff x="0" y="0"/>
+          <a:chExt cx="0" cy="0"/>
+        </a:xfrm>
+      </p:grpSpPr>
+      <p:sp>
+        <p:nvSpPr>
+          <p:cNvPr id="2" name="Title 1"/>
+          <p:cNvSpPr>
+            <a:spLocks noGrp="1"/>
+          </p:cNvSpPr>
+          <p:nvPr>
+            <p:ph type="title"/>
+          </p:nvPr>
+        </p:nvSpPr>
+        <p:spPr/>
+        <p:txBody>
+          <a:bodyPr/>
+          <a:lstStyle/>
+          <a:p>
+            <a:r>
+              <a:rPr lang="en-US" dirty="0" smtClean="0"/>
+              <a:t>Protractor Reference</a:t>
+            </a:r>
+            <a:endParaRPr lang="en-US" dirty="0"/>
+          </a:p>
+        </p:txBody>
+      </p:sp>
+      <p:sp>
+        <p:nvSpPr>
+          <p:cNvPr id="3" name="Content Placeholder 2"/>
+          <p:cNvSpPr>
+            <a:spLocks noGrp="1"/>
+          </p:cNvSpPr>
+          <p:nvPr>
+            <p:ph idx="1"/>
+          </p:nvPr>
+        </p:nvSpPr>
+        <p:spPr/>
+        <p:txBody>
+          <a:bodyPr/>
+          <a:lstStyle/>
+          <a:p>
+            <a:pPr>
+              <a:buFont typeface="Wingdings" panose="05000000000000000000" pitchFamily="2" charset="2"/>
+              <a:buChar char="Ø"/>
+            </a:pPr>
+            <a:r>
+              <a:rPr lang="en-US" dirty="0">
+                <a:hlinkClick r:id="rId2"/>
+              </a:rPr>
+              <a:t>https://</a:t>
+            </a:r>
+            <a:r>
+              <a:rPr lang="en-US" dirty="0" smtClean="0">
+                <a:hlinkClick r:id="rId2"/>
+              </a:rPr>
+              <a:t>www.protractortest.org/</a:t>
+            </a:r>
+            <a:endParaRPr lang="en-US" dirty="0" smtClean="0"/>
+          </a:p>
+          <a:p>
+            <a:pPr>
+              <a:buFont typeface="Wingdings" panose="05000000000000000000" pitchFamily="2" charset="2"/>
+              <a:buChar char="Ø"/>
+            </a:pPr>
+            <a:r>
+              <a:rPr lang="en-US" dirty="0">
+                <a:hlinkClick r:id="rId3"/>
+              </a:rPr>
+              <a:t>https://</a:t>
+            </a:r>
+            <a:r>
+              <a:rPr lang="en-US" dirty="0" smtClean="0">
+                <a:hlinkClick r:id="rId3"/>
+              </a:rPr>
+              <a:t>www.toolsqa.com/protractor/what-is-protractor/</a:t>
+            </a:r>
+            <a:endParaRPr lang="en-US" dirty="0" smtClean="0"/>
+          </a:p>
+          <a:p>
+            <a:pPr>
+              <a:buFont typeface="Wingdings" panose="05000000000000000000" pitchFamily="2" charset="2"/>
+              <a:buChar char="Ø"/>
+            </a:pPr>
+            <a:r>
+              <a:rPr lang="en-US" dirty="0">
+                <a:hlinkClick r:id="rId4"/>
+              </a:rPr>
+              <a:t>https://www.testbytes.net/blog/protractor-vs-selenium/</a:t>
+            </a:r>
+            <a:endParaRPr lang="en-US" dirty="0"/>
+          </a:p>
+        </p:txBody>
+      </p:sp>
+    </p:spTree>
+    <p:extLst>
+      <p:ext uri="{BB962C8B-B14F-4D97-AF65-F5344CB8AC3E}">
+        <p14:creationId xmlns:p14="http://schemas.microsoft.com/office/powerpoint/2010/main" val="848941522"/>
+      </p:ext>
+    </p:extLst>
+  </p:cSld>
+  <p:clrMapOvr>
+    <a:masterClrMapping/>
+  </p:clrMapOvr>
+</p:sld>
+</file>
+
+<file path=ppt/slides/slide22.xml><?xml version="1.0" encoding="utf-8"?>
+<p:sld xmlns:a="http://schemas.openxmlformats.org/drawingml/2006/main" xmlns:r="http://schemas.openxmlformats.org/officeDocument/2006/relationships" xmlns:p="http://schemas.openxmlformats.org/presentationml/2006/main">
+  <p:cSld>
+    <p:spTree>
+      <p:nvGrpSpPr>
+        <p:cNvPr id="1" name=""/>
+        <p:cNvGrpSpPr/>
+        <p:nvPr/>
+      </p:nvGrpSpPr>
+      <p:grpSpPr>
+        <a:xfrm>
+          <a:off x="0" y="0"/>
+          <a:ext cx="0" cy="0"/>
+          <a:chOff x="0" y="0"/>
+          <a:chExt cx="0" cy="0"/>
+        </a:xfrm>
+      </p:grpSpPr>
+      <p:sp>
+        <p:nvSpPr>
+          <p:cNvPr id="2" name="Title 1"/>
+          <p:cNvSpPr>
+            <a:spLocks noGrp="1"/>
+          </p:cNvSpPr>
+          <p:nvPr>
+            <p:ph type="title"/>
+          </p:nvPr>
+        </p:nvSpPr>
+        <p:spPr/>
+        <p:txBody>
+          <a:bodyPr/>
+          <a:lstStyle/>
+          <a:p>
+            <a:r>
+              <a:rPr lang="en-US" dirty="0" smtClean="0"/>
+              <a:t>Q and A</a:t>
+            </a:r>
+            <a:endParaRPr lang="en-US" dirty="0"/>
+          </a:p>
+        </p:txBody>
+      </p:sp>
+      <p:sp>
+        <p:nvSpPr>
+          <p:cNvPr id="4" name="Content Placeholder 2"/>
+          <p:cNvSpPr txBox="1">
+            <a:spLocks/>
+          </p:cNvSpPr>
+          <p:nvPr/>
+        </p:nvSpPr>
+        <p:spPr>
+          <a:xfrm>
+            <a:off x="1154955" y="1334862"/>
+            <a:ext cx="9741645" cy="5104038"/>
+          </a:xfrm>
+          <a:prstGeom prst="rect">
+            <a:avLst/>
+          </a:prstGeom>
+        </p:spPr>
+        <p:txBody>
+          <a:bodyPr vert="horz" lIns="91440" tIns="45720" rIns="91440" bIns="45720" rtlCol="0">
+            <a:normAutofit/>
+          </a:bodyPr>
+          <a:lstStyle>
+            <a:lvl1pPr marL="342900" indent="-342900" algn="l" defTabSz="457200" rtl="0" eaLnBrk="1" latinLnBrk="0" hangingPunct="1">
+              <a:spcBef>
+                <a:spcPts val="1000"/>
+              </a:spcBef>
+              <a:spcAft>
+                <a:spcPts val="0"/>
+              </a:spcAft>
+              <a:buClr>
+                <a:schemeClr val="accent1"/>
+              </a:buClr>
+              <a:buSzPct val="80000"/>
+              <a:buFont typeface="Wingdings 3" charset="2"/>
+              <a:buChar char=""/>
+              <a:defRPr sz="1800" b="0" i="0" kern="1200">
+                <a:solidFill>
+                  <a:schemeClr val="tx1">
+                    <a:lumMod val="75000"/>
+                    <a:lumOff val="25000"/>
+                  </a:schemeClr>
+                </a:solidFill>
+                <a:latin typeface="+mn-lt"/>
+                <a:ea typeface="+mn-ea"/>
+                <a:cs typeface="+mn-cs"/>
+              </a:defRPr>
+            </a:lvl1pPr>
+            <a:lvl2pPr marL="742950" indent="-285750" algn="l" defTabSz="457200" rtl="0" eaLnBrk="1" latinLnBrk="0" hangingPunct="1">
+              <a:spcBef>
+                <a:spcPts val="1000"/>
+              </a:spcBef>
+              <a:spcAft>
+                <a:spcPts val="0"/>
+              </a:spcAft>
+              <a:buClr>
+                <a:schemeClr val="accent1"/>
+              </a:buClr>
+              <a:buSzPct val="80000"/>
+              <a:buFont typeface="Wingdings 3" charset="2"/>
+              <a:buChar char=""/>
+              <a:defRPr sz="1600" b="0" i="0" kern="1200">
+                <a:solidFill>
+                  <a:schemeClr val="tx1">
+                    <a:lumMod val="75000"/>
+                    <a:lumOff val="25000"/>
+                  </a:schemeClr>
+                </a:solidFill>
+                <a:latin typeface="+mn-lt"/>
+                <a:ea typeface="+mn-ea"/>
+                <a:cs typeface="+mn-cs"/>
+              </a:defRPr>
+            </a:lvl2pPr>
+            <a:lvl3pPr marL="1143000" indent="-228600" algn="l" defTabSz="457200" rtl="0" eaLnBrk="1" latinLnBrk="0" hangingPunct="1">
+              <a:spcBef>
+                <a:spcPts val="1000"/>
+              </a:spcBef>
+              <a:spcAft>
+                <a:spcPts val="0"/>
+              </a:spcAft>
+              <a:buClr>
+                <a:schemeClr val="accent1"/>
+              </a:buClr>
+              <a:buSzPct val="80000"/>
+              <a:buFont typeface="Wingdings 3" charset="2"/>
+              <a:buChar char=""/>
+              <a:defRPr sz="1400" b="0" i="0" kern="1200">
+                <a:solidFill>
+                  <a:schemeClr val="tx1">
+                    <a:lumMod val="75000"/>
+                    <a:lumOff val="25000"/>
+                  </a:schemeClr>
+                </a:solidFill>
+                <a:latin typeface="+mn-lt"/>
+                <a:ea typeface="+mn-ea"/>
+                <a:cs typeface="+mn-cs"/>
+              </a:defRPr>
+            </a:lvl3pPr>
+            <a:lvl4pPr marL="1600200" indent="-228600" algn="l" defTabSz="457200" rtl="0" eaLnBrk="1" latinLnBrk="0" hangingPunct="1">
+              <a:spcBef>
+                <a:spcPts val="1000"/>
+              </a:spcBef>
+              <a:spcAft>
+                <a:spcPts val="0"/>
+              </a:spcAft>
+              <a:buClr>
+                <a:schemeClr val="accent1"/>
+              </a:buClr>
+              <a:buSzPct val="80000"/>
+              <a:buFont typeface="Wingdings 3" charset="2"/>
+              <a:buChar char=""/>
+              <a:defRPr sz="1200" b="0" i="0" kern="1200">
+                <a:solidFill>
+                  <a:schemeClr val="tx1">
+                    <a:lumMod val="75000"/>
+                    <a:lumOff val="25000"/>
+                  </a:schemeClr>
+                </a:solidFill>
+                <a:latin typeface="+mn-lt"/>
+                <a:ea typeface="+mn-ea"/>
+                <a:cs typeface="+mn-cs"/>
+              </a:defRPr>
+            </a:lvl4pPr>
+            <a:lvl5pPr marL="2057400" indent="-228600" algn="l" defTabSz="457200" rtl="0" eaLnBrk="1" latinLnBrk="0" hangingPunct="1">
+              <a:spcBef>
+                <a:spcPts val="1000"/>
+              </a:spcBef>
+              <a:spcAft>
+                <a:spcPts val="0"/>
+              </a:spcAft>
+              <a:buClr>
+                <a:schemeClr val="accent1"/>
+              </a:buClr>
+              <a:buSzPct val="80000"/>
+              <a:buFont typeface="Wingdings 3" charset="2"/>
+              <a:buChar char=""/>
+              <a:defRPr sz="1200" b="0" i="0" kern="1200">
+                <a:solidFill>
+                  <a:schemeClr val="tx1">
+                    <a:lumMod val="75000"/>
+                    <a:lumOff val="25000"/>
+                  </a:schemeClr>
+                </a:solidFill>
+                <a:latin typeface="+mn-lt"/>
+                <a:ea typeface="+mn-ea"/>
+                <a:cs typeface="+mn-cs"/>
+              </a:defRPr>
+            </a:lvl5pPr>
+            <a:lvl6pPr marL="2514600" indent="-228600" algn="l" defTabSz="457200" rtl="0" eaLnBrk="1" latinLnBrk="0" hangingPunct="1">
+              <a:spcBef>
+                <a:spcPts val="1000"/>
+              </a:spcBef>
+              <a:spcAft>
+                <a:spcPts val="0"/>
+              </a:spcAft>
+              <a:buClr>
+                <a:schemeClr val="accent1"/>
+              </a:buClr>
+              <a:buSzPct val="80000"/>
+              <a:buFont typeface="Wingdings 3" charset="2"/>
+              <a:buChar char=""/>
+              <a:defRPr sz="1200" b="0" i="0" kern="1200">
+                <a:solidFill>
+                  <a:schemeClr val="tx1">
+                    <a:lumMod val="75000"/>
+                    <a:lumOff val="25000"/>
+                  </a:schemeClr>
+                </a:solidFill>
+                <a:latin typeface="+mn-lt"/>
+                <a:ea typeface="+mn-ea"/>
+                <a:cs typeface="+mn-cs"/>
+              </a:defRPr>
+            </a:lvl6pPr>
+            <a:lvl7pPr marL="2971800" indent="-228600" algn="l" defTabSz="457200" rtl="0" eaLnBrk="1" latinLnBrk="0" hangingPunct="1">
+              <a:spcBef>
+                <a:spcPts val="1000"/>
+              </a:spcBef>
+              <a:spcAft>
+                <a:spcPts val="0"/>
+              </a:spcAft>
+              <a:buClr>
+                <a:schemeClr val="accent1"/>
+              </a:buClr>
+              <a:buSzPct val="80000"/>
+              <a:buFont typeface="Wingdings 3" charset="2"/>
+              <a:buChar char=""/>
+              <a:defRPr sz="1200" b="0" i="0" kern="1200">
+                <a:solidFill>
+                  <a:schemeClr val="tx1">
+                    <a:lumMod val="75000"/>
+                    <a:lumOff val="25000"/>
+                  </a:schemeClr>
+                </a:solidFill>
+                <a:latin typeface="+mn-lt"/>
+                <a:ea typeface="+mn-ea"/>
+                <a:cs typeface="+mn-cs"/>
+              </a:defRPr>
+            </a:lvl7pPr>
+            <a:lvl8pPr marL="3429000" indent="-228600" algn="l" defTabSz="457200" rtl="0" eaLnBrk="1" latinLnBrk="0" hangingPunct="1">
+              <a:spcBef>
+                <a:spcPts val="1000"/>
+              </a:spcBef>
+              <a:spcAft>
+                <a:spcPts val="0"/>
+              </a:spcAft>
+              <a:buClr>
+                <a:schemeClr val="accent1"/>
+              </a:buClr>
+              <a:buSzPct val="80000"/>
+              <a:buFont typeface="Wingdings 3" charset="2"/>
+              <a:buChar char=""/>
+              <a:defRPr sz="1200" b="0" i="0" kern="1200">
+                <a:solidFill>
+                  <a:schemeClr val="tx1">
+                    <a:lumMod val="75000"/>
+                    <a:lumOff val="25000"/>
+                  </a:schemeClr>
+                </a:solidFill>
+                <a:latin typeface="+mn-lt"/>
+                <a:ea typeface="+mn-ea"/>
+                <a:cs typeface="+mn-cs"/>
+              </a:defRPr>
+            </a:lvl8pPr>
+            <a:lvl9pPr marL="3886200" indent="-228600" algn="l" defTabSz="457200" rtl="0" eaLnBrk="1" latinLnBrk="0" hangingPunct="1">
+              <a:spcBef>
+                <a:spcPts val="1000"/>
+              </a:spcBef>
+              <a:spcAft>
+                <a:spcPts val="0"/>
+              </a:spcAft>
+              <a:buClr>
+                <a:schemeClr val="accent1"/>
+              </a:buClr>
+              <a:buSzPct val="80000"/>
+              <a:buFont typeface="Wingdings 3" charset="2"/>
+              <a:buChar char=""/>
+              <a:defRPr sz="1200" b="0" i="0" kern="1200">
+                <a:solidFill>
+                  <a:schemeClr val="tx1">
+                    <a:lumMod val="75000"/>
+                    <a:lumOff val="25000"/>
+                  </a:schemeClr>
+                </a:solidFill>
+                <a:latin typeface="+mn-lt"/>
+                <a:ea typeface="+mn-ea"/>
+                <a:cs typeface="+mn-cs"/>
+              </a:defRPr>
+            </a:lvl9pPr>
+          </a:lstStyle>
+          <a:p>
+            <a:pPr marL="0" lvl="1" indent="0">
+              <a:buFont typeface="Wingdings 3" charset="2"/>
+              <a:buNone/>
+            </a:pPr>
+            <a:endParaRPr lang="en-US" sz="3200" dirty="0" smtClean="0"/>
+          </a:p>
+          <a:p>
+            <a:pPr marL="0" lvl="1" indent="0">
+              <a:buFont typeface="Wingdings 3" charset="2"/>
+              <a:buNone/>
+            </a:pPr>
+            <a:endParaRPr lang="en-US" sz="3200" dirty="0" smtClean="0"/>
+          </a:p>
+          <a:p>
+            <a:pPr marL="0" lvl="1" indent="0" algn="ctr">
+              <a:buFont typeface="Wingdings 3" charset="2"/>
+              <a:buNone/>
+            </a:pPr>
+            <a:r>
+              <a:rPr lang="en-US" sz="3200" dirty="0" smtClean="0"/>
+              <a:t>Question please.</a:t>
+            </a:r>
+            <a:endParaRPr lang="en-US" sz="3200" dirty="0"/>
+          </a:p>
+        </p:txBody>
+      </p:sp>
+      <p:cxnSp>
+        <p:nvCxnSpPr>
+          <p:cNvPr id="5" name="Straight Connector 4"/>
+          <p:cNvCxnSpPr/>
+          <p:nvPr/>
+        </p:nvCxnSpPr>
+        <p:spPr>
+          <a:xfrm>
+            <a:off x="2517731" y="3194137"/>
+            <a:ext cx="7039627" cy="0"/>
+          </a:xfrm>
+          <a:prstGeom prst="line">
+            <a:avLst/>
+          </a:prstGeom>
+          <a:ln>
+            <a:solidFill>
+              <a:schemeClr val="bg1">
+                <a:lumMod val="75000"/>
+              </a:schemeClr>
+            </a:solidFill>
+          </a:ln>
+        </p:spPr>
+        <p:style>
+          <a:lnRef idx="1">
+            <a:schemeClr val="dk1"/>
+          </a:lnRef>
+          <a:fillRef idx="0">
+            <a:schemeClr val="dk1"/>
+          </a:fillRef>
+          <a:effectRef idx="0">
+            <a:schemeClr val="dk1"/>
+          </a:effectRef>
+          <a:fontRef idx="minor">
+            <a:schemeClr val="tx1"/>
+          </a:fontRef>
+        </p:style>
+      </p:cxnSp>
+      <p:pic>
+        <p:nvPicPr>
+          <p:cNvPr id="6" name="Picture 5"/>
+          <p:cNvPicPr>
+            <a:picLocks noChangeAspect="1"/>
+          </p:cNvPicPr>
+          <p:nvPr/>
+        </p:nvPicPr>
+        <p:blipFill>
+          <a:blip r:embed="rId2" cstate="print">
+            <a:extLst>
+              <a:ext uri="{28A0092B-C50C-407E-A947-70E740481C1C}">
+                <a14:useLocalDpi xmlns:a14="http://schemas.microsoft.com/office/drawing/2010/main" val="0"/>
+              </a:ext>
+            </a:extLst>
+          </a:blip>
+          <a:stretch>
+            <a:fillRect/>
+          </a:stretch>
+        </p:blipFill>
+        <p:spPr>
+          <a:xfrm>
+            <a:off x="5751094" y="3314453"/>
+            <a:ext cx="666295" cy="666295"/>
+          </a:xfrm>
+          <a:prstGeom prst="rect">
+            <a:avLst/>
+          </a:prstGeom>
+        </p:spPr>
+      </p:pic>
+    </p:spTree>
+    <p:extLst>
+      <p:ext uri="{BB962C8B-B14F-4D97-AF65-F5344CB8AC3E}">
+        <p14:creationId xmlns:p14="http://schemas.microsoft.com/office/powerpoint/2010/main" val="2152791535"/>
+      </p:ext>
+    </p:extLst>
+  </p:cSld>
+  <p:clrMapOvr>
+    <a:masterClrMapping/>
+  </p:clrMapOvr>
+</p:sld>
+</file>
+
+<file path=ppt/slides/slide23.xml><?xml version="1.0" encoding="utf-8"?>
 <p:sld xmlns:a="http://schemas.openxmlformats.org/drawingml/2006/main" xmlns:r="http://schemas.openxmlformats.org/officeDocument/2006/relationships" xmlns:p="http://schemas.openxmlformats.org/presentationml/2006/main">
   <p:cSld>
     <p:spTree>
@@ -7031,149 +8311,6 @@
 </p:sld>
 </file>
 
-<file path=ppt/slides/slide2.xml><?xml version="1.0" encoding="utf-8"?>
-<p:sld xmlns:a="http://schemas.openxmlformats.org/drawingml/2006/main" xmlns:r="http://schemas.openxmlformats.org/officeDocument/2006/relationships" xmlns:p="http://schemas.openxmlformats.org/presentationml/2006/main">
-  <p:cSld>
-    <p:spTree>
-      <p:nvGrpSpPr>
-        <p:cNvPr id="1" name=""/>
-        <p:cNvGrpSpPr/>
-        <p:nvPr/>
-      </p:nvGrpSpPr>
-      <p:grpSpPr>
-        <a:xfrm>
-          <a:off x="0" y="0"/>
-          <a:ext cx="0" cy="0"/>
-          <a:chOff x="0" y="0"/>
-          <a:chExt cx="0" cy="0"/>
-        </a:xfrm>
-      </p:grpSpPr>
-      <p:sp>
-        <p:nvSpPr>
-          <p:cNvPr id="2" name="Content Placeholder 1"/>
-          <p:cNvSpPr>
-            <a:spLocks noGrp="1"/>
-          </p:cNvSpPr>
-          <p:nvPr>
-            <p:ph idx="1"/>
-          </p:nvPr>
-        </p:nvSpPr>
-        <p:spPr/>
-        <p:txBody>
-          <a:bodyPr>
-            <a:normAutofit/>
-          </a:bodyPr>
-          <a:lstStyle/>
-          <a:p>
-            <a:pPr marL="914400" indent="-457200">
-              <a:buFont typeface="+mj-lt"/>
-              <a:buAutoNum type="arabicPeriod"/>
-            </a:pPr>
-            <a:r>
-              <a:rPr lang="en-US" sz="2000" b="1" dirty="0">
-                <a:solidFill>
-                  <a:schemeClr val="accent2"/>
-                </a:solidFill>
-              </a:rPr>
-              <a:t>Before Protractor</a:t>
-            </a:r>
-          </a:p>
-          <a:p>
-            <a:pPr marL="914400" indent="-457200">
-              <a:buFont typeface="+mj-lt"/>
-              <a:buAutoNum type="arabicPeriod"/>
-            </a:pPr>
-            <a:r>
-              <a:rPr lang="en-US" sz="2000" b="1" dirty="0">
-                <a:solidFill>
-                  <a:schemeClr val="accent2"/>
-                </a:solidFill>
-              </a:rPr>
-              <a:t>Protractor</a:t>
-            </a:r>
-          </a:p>
-          <a:p>
-            <a:pPr marL="914400" indent="-457200">
-              <a:buFont typeface="+mj-lt"/>
-              <a:buAutoNum type="arabicPeriod"/>
-            </a:pPr>
-            <a:r>
-              <a:rPr lang="en-US" sz="2000" b="1" dirty="0">
-                <a:solidFill>
-                  <a:schemeClr val="accent2"/>
-                </a:solidFill>
-              </a:rPr>
-              <a:t>After Protractor</a:t>
-            </a:r>
-          </a:p>
-          <a:p>
-            <a:pPr marL="914400" indent="-457200">
-              <a:buFont typeface="+mj-lt"/>
-              <a:buAutoNum type="arabicPeriod"/>
-            </a:pPr>
-            <a:r>
-              <a:rPr lang="en-US" sz="2000" b="1" dirty="0">
-                <a:solidFill>
-                  <a:schemeClr val="accent2"/>
-                </a:solidFill>
-              </a:rPr>
-              <a:t>Q and A</a:t>
-            </a:r>
-          </a:p>
-          <a:p>
-            <a:pPr marL="400050" lvl="1" indent="0">
-              <a:buNone/>
-            </a:pPr>
-            <a:endParaRPr lang="en-US" b="1" dirty="0">
-              <a:solidFill>
-                <a:schemeClr val="accent2"/>
-              </a:solidFill>
-            </a:endParaRPr>
-          </a:p>
-        </p:txBody>
-      </p:sp>
-      <p:sp>
-        <p:nvSpPr>
-          <p:cNvPr id="3" name="Title 2"/>
-          <p:cNvSpPr>
-            <a:spLocks noGrp="1"/>
-          </p:cNvSpPr>
-          <p:nvPr>
-            <p:ph type="title"/>
-          </p:nvPr>
-        </p:nvSpPr>
-        <p:spPr/>
-        <p:txBody>
-          <a:bodyPr/>
-          <a:lstStyle/>
-          <a:p>
-            <a:r>
-              <a:rPr lang="vi-VN" dirty="0" smtClean="0">
-                <a:latin typeface="Century Gothic (Body)"/>
-              </a:rPr>
-              <a:t>Content:</a:t>
-            </a:r>
-            <a:endParaRPr lang="en-US" dirty="0">
-              <a:latin typeface="Century Gothic (Body)"/>
-            </a:endParaRPr>
-          </a:p>
-        </p:txBody>
-      </p:sp>
-    </p:spTree>
-  </p:cSld>
-  <p:clrMapOvr>
-    <a:masterClrMapping/>
-  </p:clrMapOvr>
-  <p:timing>
-    <p:tnLst>
-      <p:par>
-        <p:cTn id="1" dur="indefinite" restart="never" nodeType="tmRoot"/>
-      </p:par>
-    </p:tnLst>
-  </p:timing>
-</p:sld>
-</file>
-
 <file path=ppt/slides/slide3.xml><?xml version="1.0" encoding="utf-8"?>
 <p:sld xmlns:a="http://schemas.openxmlformats.org/drawingml/2006/main" xmlns:r="http://schemas.openxmlformats.org/officeDocument/2006/relationships" xmlns:p="http://schemas.openxmlformats.org/presentationml/2006/main">
   <p:cSld>
@@ -7375,24 +8512,18 @@
           <a:lstStyle/>
           <a:p>
             <a:r>
-              <a:rPr lang="en-US" smtClean="0">
-                <a:solidFill>
-                  <a:schemeClr val="accent2"/>
-                </a:solidFill>
+              <a:rPr lang="en-US" dirty="0">
                 <a:sym typeface="+mn-ea"/>
               </a:rPr>
               <a:t>Sync and </a:t>
             </a:r>
             <a:r>
-              <a:rPr lang="en-US" err="1" smtClean="0">
-                <a:solidFill>
-                  <a:schemeClr val="accent2"/>
-                </a:solidFill>
+              <a:rPr lang="en-US" dirty="0" err="1">
                 <a:sym typeface="+mn-ea"/>
               </a:rPr>
               <a:t>Async</a:t>
             </a:r>
-            <a:endParaRPr lang="en-US"/>
+            <a:endParaRPr lang="en-US" dirty="0"/>
           </a:p>
         </p:txBody>
       </p:sp>
@@ -7430,7 +8561,7 @@
                         <a:buNone/>
                       </a:pPr>
                       <a:r>
-                        <a:rPr lang="en-US" altLang="en-US" sz="2000"/>
+                        <a:rPr lang="en-US" altLang="en-US" sz="2000" dirty="0"/>
                         <a:t>Sync</a:t>
                       </a:r>
                     </a:p>
@@ -7539,7 +8670,7 @@
                         <a:buNone/>
                       </a:pPr>
                       <a:r>
-                        <a:rPr lang="en-US"/>
+                        <a:rPr lang="en-US" dirty="0"/>
                         <a:t>Running synchronously will generate unnecessary and idle wait in some cases</a:t>
                       </a:r>
                     </a:p>
@@ -7555,27 +8686,27 @@
                         <a:buNone/>
                       </a:pPr>
                       <a:r>
-                        <a:rPr lang="en-US"/>
+                        <a:rPr lang="en-US" dirty="0"/>
                         <a:t>Running asynchronously so </a:t>
                       </a:r>
                       <a:r>
-                        <a:rPr lang="en-US" altLang="en-US"/>
+                        <a:rPr lang="en-US" altLang="en-US" dirty="0"/>
                         <a:t>it </a:t>
                       </a:r>
                       <a:r>
-                        <a:rPr lang="en-US"/>
+                        <a:rPr lang="en-US" dirty="0"/>
                         <a:t>can handle many </a:t>
                       </a:r>
                       <a:r>
-                        <a:rPr lang="en-US" altLang="en-US"/>
+                        <a:rPr lang="en-US" altLang="en-US" dirty="0"/>
                         <a:t>tasks </a:t>
                       </a:r>
                       <a:r>
-                        <a:rPr lang="en-US"/>
+                        <a:rPr lang="en-US" dirty="0"/>
                         <a:t>at the same time </a:t>
                       </a:r>
                       <a:r>
-                        <a:rPr lang="en-US" altLang="en-US"/>
+                        <a:rPr lang="en-US" altLang="en-US" dirty="0"/>
                         <a:t>,</a:t>
                       </a:r>
                     </a:p>
@@ -7584,7 +8715,7 @@
                         <a:buNone/>
                       </a:pPr>
                       <a:r>
-                        <a:rPr lang="en-US" altLang="en-US"/>
+                        <a:rPr lang="en-US" altLang="en-US" dirty="0"/>
                         <a:t>but it is easy to get a process error if it is not well controlled </a:t>
                       </a:r>
                     </a:p>
@@ -7637,10 +8768,10 @@
           <a:lstStyle/>
           <a:p>
             <a:r>
-              <a:rPr lang="en-US" smtClean="0"/>
+              <a:rPr lang="en-US" dirty="0" err="1" smtClean="0"/>
               <a:t>Javascript</a:t>
             </a:r>
-            <a:endParaRPr lang="en-US"/>
+            <a:endParaRPr lang="en-US" dirty="0"/>
           </a:p>
         </p:txBody>
       </p:sp>
@@ -7913,15 +9044,23 @@
             </a:r>
             <a:r>
               <a:rPr lang="en-US" dirty="0" smtClean="0"/>
-              <a:t> with backend </a:t>
-            </a:r>
-            <a:r>
-              <a:rPr lang="en-US" dirty="0" err="1" smtClean="0"/>
-              <a:t>apis</a:t>
+              <a:t> </a:t>
             </a:r>
             <a:r>
               <a:rPr lang="en-US" dirty="0" smtClean="0"/>
-              <a:t> for server, database …</a:t>
+              <a:t>with backend </a:t>
+            </a:r>
+            <a:r>
+              <a:rPr lang="en-US" dirty="0" smtClean="0"/>
+              <a:t>API</a:t>
+            </a:r>
+            <a:r>
+              <a:rPr lang="en-US" dirty="0" smtClean="0"/>
+              <a:t>s </a:t>
+            </a:r>
+            <a:r>
+              <a:rPr lang="en-US" dirty="0" smtClean="0"/>
+              <a:t>for server, database …</a:t>
             </a:r>
           </a:p>
           <a:p>
@@ -8169,14 +9308,12 @@
               <a:t>Types are free documentation that increase understanding and improve developer's </a:t>
             </a:r>
             <a:r>
-              <a:rPr lang="en-US" dirty="0" err="1" smtClean="0"/>
-              <a:t>pr</a:t>
-            </a:r>
-            <a:r>
-              <a:rPr lang="vi-VN" dirty="0" smtClean="0"/>
-              <a:t>oductivity</a:t>
-            </a:r>
-            <a:endParaRPr lang="en-US" dirty="0" smtClean="0"/>
+              <a:rPr lang="en-US" dirty="0" smtClean="0"/>
+              <a:t>productivity</a:t>
+            </a:r>
+            <a:endParaRPr lang="en-US" dirty="0">
+              <a:latin typeface="Century" panose="02040604050505020304" pitchFamily="18" charset="0"/>
+            </a:endParaRPr>
           </a:p>
           <a:p>
             <a:pPr>
@@ -8185,15 +9322,7 @@
             </a:pPr>
             <a:r>
               <a:rPr lang="en-US" dirty="0" smtClean="0"/>
-              <a:t>Strong </a:t>
-            </a:r>
-            <a:r>
-              <a:rPr lang="en-US" dirty="0"/>
-              <a:t>type checking helps prevent errors and enhances </a:t>
-            </a:r>
-            <a:r>
-              <a:rPr lang="en-US" dirty="0" smtClean="0"/>
-              <a:t>reliability</a:t>
+              <a:t>Strong type checking helps prevent errors and enhances reliability</a:t>
             </a:r>
           </a:p>
           <a:p>
@@ -8203,8 +9332,17 @@
             </a:pPr>
             <a:r>
               <a:rPr lang="en-US" dirty="0" smtClean="0"/>
-              <a:t>Increase self-documented code</a:t>
-            </a:r>
+              <a:t>Increase </a:t>
+            </a:r>
+            <a:r>
+              <a:rPr lang="en-US" dirty="0" smtClean="0"/>
+              <a:t>self-documented </a:t>
+            </a:r>
+            <a:r>
+              <a:rPr lang="en-US" dirty="0" smtClean="0"/>
+              <a:t>code</a:t>
+            </a:r>
+            <a:endParaRPr lang="en-US" dirty="0" smtClean="0"/>
           </a:p>
         </p:txBody>
       </p:sp>
@@ -8309,10 +9447,10 @@
           <a:lstStyle/>
           <a:p>
             <a:r>
-              <a:rPr lang="en-US" smtClean="0"/>
+              <a:rPr lang="en-US" dirty="0" smtClean="0"/>
               <a:t>Typescript</a:t>
             </a:r>
-            <a:endParaRPr lang="en-US"/>
+            <a:endParaRPr lang="en-US" dirty="0"/>
           </a:p>
         </p:txBody>
       </p:sp>
@@ -8620,6 +9758,13 @@
   <p:clrMapOvr>
     <a:masterClrMapping/>
   </p:clrMapOvr>
+  <p:timing>
+    <p:tnLst>
+      <p:par>
+        <p:cTn id="1" dur="indefinite" restart="never" nodeType="tmRoot"/>
+      </p:par>
+    </p:tnLst>
+  </p:timing>
 </p:sld>
 </file>
 
@@ -8656,424 +9801,118 @@
           <a:lstStyle/>
           <a:p>
             <a:r>
-              <a:rPr lang="en-US"/>
-              <a:t>Comparing some characteristic when coding in </a:t>
-            </a:r>
-            <a:r>
-              <a:rPr lang="en-US" altLang="en-US"/>
-              <a:t>T</a:t>
-            </a:r>
-            <a:r>
-              <a:rPr lang="en-US"/>
-              <a:t>ypescript and </a:t>
-            </a:r>
-            <a:r>
-              <a:rPr lang="en-US" altLang="en-US"/>
-              <a:t>J</a:t>
-            </a:r>
-            <a:r>
-              <a:rPr lang="en-US"/>
-              <a:t>ava</a:t>
+              <a:rPr lang="en-US" dirty="0"/>
+              <a:t>Typescript</a:t>
             </a:r>
           </a:p>
         </p:txBody>
       </p:sp>
-      <p:graphicFrame>
-        <p:nvGraphicFramePr>
-          <p:cNvPr id="4" name="Content Placeholder 3"/>
-          <p:cNvGraphicFramePr>
-            <a:graphicFrameLocks noGrp="1"/>
-          </p:cNvGraphicFramePr>
+      <p:pic>
+        <p:nvPicPr>
+          <p:cNvPr id="5" name="Content Placeholder 4"/>
+          <p:cNvPicPr>
+            <a:picLocks noGrp="1" noChangeAspect="1"/>
+          </p:cNvPicPr>
           <p:nvPr>
             <p:ph idx="1"/>
           </p:nvPr>
-        </p:nvGraphicFramePr>
-        <p:xfrm>
-          <a:off x="1154955" y="1654175"/>
-          <a:ext cx="9869170" cy="4602480"/>
-        </p:xfrm>
-        <a:graphic>
-          <a:graphicData uri="http://schemas.openxmlformats.org/drawingml/2006/table">
-            <a:tbl>
-              <a:tblPr firstRow="1" bandRow="1">
-                <a:tableStyleId>{5C22544A-7EE6-4342-B048-85BDC9FD1C3A}</a:tableStyleId>
-              </a:tblPr>
-              <a:tblGrid>
-                <a:gridCol w="4934585"/>
-                <a:gridCol w="4934585"/>
-              </a:tblGrid>
-              <a:tr h="381000">
-                <a:tc>
-                  <a:txBody>
-                    <a:bodyPr/>
-                    <a:lstStyle/>
-                    <a:p>
-                      <a:pPr algn="ctr">
-                        <a:buNone/>
-                      </a:pPr>
-                      <a:r>
-                        <a:rPr lang="en-US" altLang="en-US" dirty="0"/>
-                        <a:t>Typescript</a:t>
-                      </a:r>
-                    </a:p>
-                  </a:txBody>
-                  <a:tcPr/>
-                </a:tc>
-                <a:tc>
-                  <a:txBody>
-                    <a:bodyPr/>
-                    <a:lstStyle/>
-                    <a:p>
-                      <a:pPr algn="ctr">
-                        <a:buNone/>
-                      </a:pPr>
-                      <a:r>
-                        <a:rPr lang="en-US" altLang="en-US" sz="1800" dirty="0">
-                          <a:sym typeface="+mn-ea"/>
-                        </a:rPr>
-                        <a:t>J</a:t>
-                      </a:r>
-                      <a:r>
-                        <a:rPr lang="en-US" sz="1800" dirty="0">
-                          <a:sym typeface="+mn-ea"/>
-                        </a:rPr>
-                        <a:t>ava</a:t>
-                      </a:r>
-                      <a:endParaRPr lang="en-US" dirty="0"/>
-                    </a:p>
-                  </a:txBody>
-                  <a:tcPr/>
-                </a:tc>
-              </a:tr>
-              <a:tr h="381000">
-                <a:tc>
-                  <a:txBody>
-                    <a:bodyPr/>
-                    <a:lstStyle/>
-                    <a:p>
-                      <a:pPr marL="0" marR="0" indent="0" algn="l" defTabSz="457200" rtl="0" eaLnBrk="1" fontAlgn="auto" latinLnBrk="0" hangingPunct="1">
-                        <a:lnSpc>
-                          <a:spcPct val="100000"/>
-                        </a:lnSpc>
-                        <a:spcBef>
-                          <a:spcPts val="0"/>
-                        </a:spcBef>
-                        <a:spcAft>
-                          <a:spcPts val="0"/>
-                        </a:spcAft>
-                        <a:buClrTx/>
-                        <a:buSzTx/>
-                        <a:buFontTx/>
-                        <a:buNone/>
-                        <a:defRPr/>
-                      </a:pPr>
-                      <a:r>
-                        <a:rPr lang="en-US" sz="1800" kern="1200" smtClean="0">
-                          <a:solidFill>
-                            <a:schemeClr val="dk1"/>
-                          </a:solidFill>
-                          <a:latin typeface="+mn-lt"/>
-                          <a:ea typeface="+mn-ea"/>
-                          <a:cs typeface="+mn-cs"/>
-                        </a:rPr>
-                        <a:t>A </a:t>
-                      </a:r>
-                      <a:r>
-                        <a:rPr lang="en-US" sz="1800" i="1" kern="1200" smtClean="0">
-                          <a:solidFill>
-                            <a:schemeClr val="dk1"/>
-                          </a:solidFill>
-                          <a:latin typeface="+mn-lt"/>
-                          <a:ea typeface="+mn-ea"/>
-                          <a:cs typeface="+mn-cs"/>
-                        </a:rPr>
-                        <a:t>superset</a:t>
-                      </a:r>
-                      <a:r>
-                        <a:rPr lang="en-US" sz="1800" kern="1200" smtClean="0">
-                          <a:solidFill>
-                            <a:schemeClr val="dk1"/>
-                          </a:solidFill>
-                          <a:latin typeface="+mn-lt"/>
-                          <a:ea typeface="+mn-ea"/>
-                          <a:cs typeface="+mn-cs"/>
-                        </a:rPr>
-                        <a:t> of JavaScript, It is used to add additional static type and check type at compile time</a:t>
-                      </a:r>
-                      <a:endParaRPr lang="vi-VN" sz="1800" kern="1200" smtClean="0">
-                        <a:solidFill>
-                          <a:schemeClr val="dk1"/>
-                        </a:solidFill>
-                        <a:latin typeface="+mn-lt"/>
-                        <a:ea typeface="+mn-ea"/>
-                        <a:cs typeface="+mn-cs"/>
-                      </a:endParaRPr>
-                    </a:p>
-                  </a:txBody>
-                  <a:tcPr/>
-                </a:tc>
-                <a:tc>
-                  <a:txBody>
-                    <a:bodyPr/>
-                    <a:lstStyle/>
-                    <a:p>
-                      <a:pPr>
-                        <a:buNone/>
-                      </a:pPr>
-                      <a:r>
-                        <a:rPr lang="en-US" smtClean="0"/>
-                        <a:t>A pure oriented object programming language</a:t>
-                      </a:r>
-                      <a:endParaRPr lang="en-US"/>
-                    </a:p>
-                  </a:txBody>
-                  <a:tcPr/>
-                </a:tc>
-              </a:tr>
-              <a:tr h="381000">
-                <a:tc>
-                  <a:txBody>
-                    <a:bodyPr/>
-                    <a:lstStyle/>
-                    <a:p>
-                      <a:pPr>
-                        <a:buNone/>
-                      </a:pPr>
-                      <a:r>
-                        <a:rPr lang="en-US" smtClean="0"/>
-                        <a:t>There</a:t>
-                      </a:r>
-                      <a:r>
-                        <a:rPr lang="en-US" baseline="0" smtClean="0"/>
-                        <a:t> is not access modifier for class </a:t>
-                      </a:r>
-                      <a:endParaRPr lang="en-US"/>
-                    </a:p>
-                  </a:txBody>
-                  <a:tcPr/>
-                </a:tc>
-                <a:tc>
-                  <a:txBody>
-                    <a:bodyPr/>
-                    <a:lstStyle/>
-                    <a:p>
-                      <a:pPr>
-                        <a:buNone/>
-                      </a:pPr>
-                      <a:r>
-                        <a:rPr lang="en-US" smtClean="0"/>
-                        <a:t>There is access modifier</a:t>
-                      </a:r>
-                      <a:r>
-                        <a:rPr lang="en-US" baseline="0" smtClean="0"/>
-                        <a:t> for class</a:t>
-                      </a:r>
-                      <a:endParaRPr lang="en-US"/>
-                    </a:p>
-                  </a:txBody>
-                  <a:tcPr/>
-                </a:tc>
-              </a:tr>
-              <a:tr h="381000">
-                <a:tc>
-                  <a:txBody>
-                    <a:bodyPr/>
-                    <a:lstStyle/>
-                    <a:p>
-                      <a:pPr>
-                        <a:buNone/>
-                      </a:pPr>
-                      <a:r>
-                        <a:rPr lang="en-US" dirty="0" smtClean="0"/>
-                        <a:t>Happening</a:t>
-                      </a:r>
-                      <a:r>
-                        <a:rPr lang="en-US" baseline="0" dirty="0" smtClean="0"/>
-                        <a:t> circular import problem because It don’t have access modifier for class</a:t>
-                      </a:r>
-                      <a:endParaRPr lang="en-US" dirty="0"/>
-                    </a:p>
-                  </a:txBody>
-                  <a:tcPr/>
-                </a:tc>
-                <a:tc>
-                  <a:txBody>
-                    <a:bodyPr/>
-                    <a:lstStyle/>
-                    <a:p>
-                      <a:pPr>
-                        <a:buNone/>
-                      </a:pPr>
-                      <a:r>
-                        <a:rPr lang="en-US" dirty="0" smtClean="0"/>
-                        <a:t>Circular</a:t>
-                      </a:r>
-                      <a:r>
-                        <a:rPr lang="en-US" baseline="0" dirty="0" smtClean="0"/>
-                        <a:t> import problem is not happened, because it have access modifier for class</a:t>
-                      </a:r>
-                      <a:endParaRPr lang="en-US" dirty="0"/>
-                    </a:p>
-                  </a:txBody>
-                  <a:tcPr/>
-                </a:tc>
-              </a:tr>
-              <a:tr h="381000">
-                <a:tc>
-                  <a:txBody>
-                    <a:bodyPr/>
-                    <a:lstStyle/>
-                    <a:p>
-                      <a:pPr>
-                        <a:buNone/>
-                      </a:pPr>
-                      <a:r>
-                        <a:rPr lang="en-US" dirty="0" smtClean="0"/>
-                        <a:t>Access</a:t>
-                      </a:r>
-                      <a:r>
-                        <a:rPr lang="en-US" baseline="0" dirty="0" smtClean="0"/>
-                        <a:t> modifier for instance variable and method:</a:t>
-                      </a:r>
-                    </a:p>
-                    <a:p>
-                      <a:pPr marL="285750" indent="-285750">
-                        <a:buFont typeface="Arial" panose="020B0604020202020204" pitchFamily="34" charset="0"/>
-                        <a:buChar char="•"/>
-                      </a:pPr>
-                      <a:r>
-                        <a:rPr lang="en-US" baseline="0" dirty="0" smtClean="0"/>
-                        <a:t>Having Public, Protected, Private access modifier </a:t>
-                      </a:r>
-                    </a:p>
-                    <a:p>
-                      <a:pPr marL="342900" indent="-342900">
-                        <a:buFont typeface="Arial" panose="020B0604020202020204" pitchFamily="34" charset="0"/>
-                        <a:buChar char="•"/>
-                      </a:pPr>
-                      <a:r>
-                        <a:rPr lang="en-US" dirty="0" smtClean="0"/>
-                        <a:t>‘Public’</a:t>
-                      </a:r>
-                      <a:r>
-                        <a:rPr lang="en-US" baseline="0" dirty="0" smtClean="0"/>
-                        <a:t> is default</a:t>
-                      </a:r>
-                    </a:p>
-                    <a:p>
-                      <a:pPr marL="342900" indent="-342900">
-                        <a:buFont typeface="Arial" panose="020B0604020202020204" pitchFamily="34" charset="0"/>
-                        <a:buChar char="•"/>
-                      </a:pPr>
-                      <a:r>
-                        <a:rPr lang="en-US" baseline="0" dirty="0" smtClean="0"/>
-                        <a:t>‘Protected’ scope is within class and any objects that inherits from it</a:t>
-                      </a:r>
-                    </a:p>
-                  </a:txBody>
-                  <a:tcPr/>
-                </a:tc>
-                <a:tc>
-                  <a:txBody>
-                    <a:bodyPr/>
-                    <a:lstStyle/>
-                    <a:p>
-                      <a:pPr marL="0" marR="0" indent="0" algn="l" defTabSz="457200" rtl="0" eaLnBrk="1" fontAlgn="auto" latinLnBrk="0" hangingPunct="1">
-                        <a:lnSpc>
-                          <a:spcPct val="100000"/>
-                        </a:lnSpc>
-                        <a:spcBef>
-                          <a:spcPts val="0"/>
-                        </a:spcBef>
-                        <a:spcAft>
-                          <a:spcPts val="0"/>
-                        </a:spcAft>
-                        <a:buClrTx/>
-                        <a:buSzTx/>
-                        <a:buFontTx/>
-                        <a:buNone/>
-                        <a:defRPr/>
-                      </a:pPr>
-                      <a:r>
-                        <a:rPr lang="en-US" dirty="0" smtClean="0"/>
-                        <a:t>Access</a:t>
-                      </a:r>
-                      <a:r>
-                        <a:rPr lang="en-US" baseline="0" dirty="0" smtClean="0"/>
-                        <a:t> modifier for instance variable and method:</a:t>
-                      </a:r>
-                    </a:p>
-                    <a:p>
-                      <a:pPr marL="285750" marR="0" indent="-285750" algn="l" defTabSz="457200" rtl="0" eaLnBrk="1" fontAlgn="auto" latinLnBrk="0" hangingPunct="1">
-                        <a:lnSpc>
-                          <a:spcPct val="100000"/>
-                        </a:lnSpc>
-                        <a:spcBef>
-                          <a:spcPts val="0"/>
-                        </a:spcBef>
-                        <a:spcAft>
-                          <a:spcPts val="0"/>
-                        </a:spcAft>
-                        <a:buClrTx/>
-                        <a:buSzTx/>
-                        <a:buFont typeface="Arial" panose="020B0604020202020204" pitchFamily="34" charset="0"/>
-                        <a:buChar char="•"/>
-                        <a:defRPr/>
-                      </a:pPr>
-                      <a:r>
-                        <a:rPr lang="en-US" baseline="0" dirty="0" smtClean="0"/>
-                        <a:t>Having Public, Protected ,Default , Private access modifier </a:t>
-                      </a:r>
-                    </a:p>
-                    <a:p>
-                      <a:pPr marL="285750" indent="-285750">
-                        <a:buFont typeface="Arial" panose="020B0604020202020204" pitchFamily="34" charset="0"/>
-                        <a:buChar char="•"/>
-                      </a:pPr>
-                      <a:r>
-                        <a:rPr lang="en-US" dirty="0" smtClean="0"/>
-                        <a:t>‘Default’</a:t>
-                      </a:r>
-                      <a:r>
-                        <a:rPr lang="en-US" baseline="0" dirty="0" smtClean="0"/>
-                        <a:t> is default</a:t>
-                      </a:r>
-                    </a:p>
-                    <a:p>
-                      <a:pPr marL="285750" marR="0" indent="-285750" algn="l" defTabSz="457200" rtl="0" eaLnBrk="1" fontAlgn="auto" latinLnBrk="0" hangingPunct="1">
-                        <a:lnSpc>
-                          <a:spcPct val="100000"/>
-                        </a:lnSpc>
-                        <a:spcBef>
-                          <a:spcPts val="0"/>
-                        </a:spcBef>
-                        <a:spcAft>
-                          <a:spcPts val="0"/>
-                        </a:spcAft>
-                        <a:buClrTx/>
-                        <a:buSzTx/>
-                        <a:buFont typeface="Arial" panose="020B0604020202020204" pitchFamily="34" charset="0"/>
-                        <a:buChar char="•"/>
-                        <a:defRPr/>
-                      </a:pPr>
-                      <a:r>
-                        <a:rPr lang="en-US" baseline="0" dirty="0" smtClean="0"/>
-                        <a:t>‘Protected’ scope is within package and any objects that inherits from it</a:t>
-                      </a:r>
-                    </a:p>
-                  </a:txBody>
-                  <a:tcPr/>
-                </a:tc>
-              </a:tr>
-            </a:tbl>
-          </a:graphicData>
-        </a:graphic>
-      </p:graphicFrame>
+        </p:nvPicPr>
+        <p:blipFill>
+          <a:blip r:embed="rId2"/>
+          <a:stretch>
+            <a:fillRect/>
+          </a:stretch>
+        </p:blipFill>
+        <p:spPr>
+          <a:xfrm>
+            <a:off x="3614817" y="1689074"/>
+            <a:ext cx="6379189" cy="4617259"/>
+          </a:xfrm>
+          <a:prstGeom prst="rect">
+            <a:avLst/>
+          </a:prstGeom>
+        </p:spPr>
+      </p:pic>
+      <p:sp>
+        <p:nvSpPr>
+          <p:cNvPr id="6" name="Rectangle 5"/>
+          <p:cNvSpPr/>
+          <p:nvPr/>
+        </p:nvSpPr>
+        <p:spPr>
+          <a:xfrm>
+            <a:off x="3709664" y="1087179"/>
+            <a:ext cx="5472973" cy="553998"/>
+          </a:xfrm>
+          <a:prstGeom prst="rect">
+            <a:avLst/>
+          </a:prstGeom>
+        </p:spPr>
+        <p:txBody>
+          <a:bodyPr wrap="none">
+            <a:spAutoFit/>
+          </a:bodyPr>
+          <a:lstStyle/>
+          <a:p>
+            <a:r>
+              <a:rPr lang="en-US" sz="3000" dirty="0">
+                <a:solidFill>
+                  <a:schemeClr val="accent1">
+                    <a:lumMod val="75000"/>
+                  </a:schemeClr>
+                </a:solidFill>
+              </a:rPr>
+              <a:t>Typescript are worth to learn</a:t>
+            </a:r>
+          </a:p>
+        </p:txBody>
+      </p:sp>
+      <p:sp>
+        <p:nvSpPr>
+          <p:cNvPr id="7" name="TextBox 6"/>
+          <p:cNvSpPr txBox="1"/>
+          <p:nvPr/>
+        </p:nvSpPr>
+        <p:spPr>
+          <a:xfrm>
+            <a:off x="409501" y="1780056"/>
+            <a:ext cx="3205316" cy="1169551"/>
+          </a:xfrm>
+          <a:prstGeom prst="rect">
+            <a:avLst/>
+          </a:prstGeom>
+          <a:noFill/>
+        </p:spPr>
+        <p:txBody>
+          <a:bodyPr wrap="square" rtlCol="0">
+            <a:spAutoFit/>
+          </a:bodyPr>
+          <a:lstStyle/>
+          <a:p>
+            <a:r>
+              <a:rPr lang="en-US" sz="1400" dirty="0"/>
+              <a:t>% of developers who are developing with the language or technology and have expressed interest in continuing to develop with it</a:t>
+            </a:r>
+          </a:p>
+        </p:txBody>
+      </p:sp>
     </p:spTree>
+    <p:extLst>
+      <p:ext uri="{BB962C8B-B14F-4D97-AF65-F5344CB8AC3E}">
+        <p14:creationId xmlns:p14="http://schemas.microsoft.com/office/powerpoint/2010/main" val="3443349679"/>
+      </p:ext>
+    </p:extLst>
   </p:cSld>
   <p:clrMapOvr>
     <a:masterClrMapping/>
   </p:clrMapOvr>
+  <p:timing>
+    <p:tnLst>
+      <p:par>
+        <p:cTn id="1" dur="indefinite" restart="never" nodeType="tmRoot"/>
+      </p:par>
+    </p:tnLst>
+  </p:timing>
 </p:sld>
 </file>
 

</xml_diff>